<commit_message>
Edited one line on PPT
</commit_message>
<xml_diff>
--- a/Final Project Presentation.pptx
+++ b/Final Project Presentation.pptx
@@ -173,7 +173,7 @@
           <a:noFill/>
           <a:extLst>
             <a:ext uri="{909E8E84-426E-40dd-AFC4-6F175D3DCCD1}">
-              <a14:hiddenFill xmlns:a14="http://schemas.microsoft.com/office/drawing/2010/main" xmlns="">
+              <a14:hiddenFill xmlns="" xmlns:a14="http://schemas.microsoft.com/office/drawing/2010/main">
                 <a:solidFill>
                   <a:srgbClr val="FFFFFF"/>
                 </a:solidFill>
@@ -232,7 +232,7 @@
             </a:ln>
             <a:extLst>
               <a:ext uri="{91240B29-F687-4f45-9708-019B960494DF}">
-                <a14:hiddenLine xmlns:a14="http://schemas.microsoft.com/office/drawing/2010/main" xmlns="" w="9525">
+                <a14:hiddenLine xmlns="" xmlns:a14="http://schemas.microsoft.com/office/drawing/2010/main" w="9525">
                   <a:solidFill>
                     <a:srgbClr val="000000"/>
                   </a:solidFill>
@@ -322,7 +322,7 @@
             </a:ln>
             <a:extLst>
               <a:ext uri="{91240B29-F687-4f45-9708-019B960494DF}">
-                <a14:hiddenLine xmlns:a14="http://schemas.microsoft.com/office/drawing/2010/main" xmlns="" w="9525">
+                <a14:hiddenLine xmlns="" xmlns:a14="http://schemas.microsoft.com/office/drawing/2010/main" w="9525">
                   <a:solidFill>
                     <a:srgbClr val="000000"/>
                   </a:solidFill>
@@ -412,7 +412,7 @@
             </a:ln>
             <a:extLst>
               <a:ext uri="{91240B29-F687-4f45-9708-019B960494DF}">
-                <a14:hiddenLine xmlns:a14="http://schemas.microsoft.com/office/drawing/2010/main" xmlns="" w="9525">
+                <a14:hiddenLine xmlns="" xmlns:a14="http://schemas.microsoft.com/office/drawing/2010/main" w="9525">
                   <a:solidFill>
                     <a:srgbClr val="000000"/>
                   </a:solidFill>
@@ -446,7 +446,7 @@
             </a:ln>
             <a:extLst>
               <a:ext uri="{91240B29-F687-4f45-9708-019B960494DF}">
-                <a14:hiddenLine xmlns:a14="http://schemas.microsoft.com/office/drawing/2010/main" xmlns="" w="9525">
+                <a14:hiddenLine xmlns="" xmlns:a14="http://schemas.microsoft.com/office/drawing/2010/main" w="9525">
                   <a:solidFill>
                     <a:srgbClr val="000000"/>
                   </a:solidFill>
@@ -536,7 +536,7 @@
             </a:ln>
             <a:extLst>
               <a:ext uri="{91240B29-F687-4f45-9708-019B960494DF}">
-                <a14:hiddenLine xmlns:a14="http://schemas.microsoft.com/office/drawing/2010/main" xmlns="" w="9525">
+                <a14:hiddenLine xmlns="" xmlns:a14="http://schemas.microsoft.com/office/drawing/2010/main" w="9525">
                   <a:solidFill>
                     <a:srgbClr val="000000"/>
                   </a:solidFill>
@@ -598,7 +598,7 @@
             </a:ln>
             <a:extLst>
               <a:ext uri="{91240B29-F687-4f45-9708-019B960494DF}">
-                <a14:hiddenLine xmlns:a14="http://schemas.microsoft.com/office/drawing/2010/main" xmlns="" w="9525">
+                <a14:hiddenLine xmlns="" xmlns:a14="http://schemas.microsoft.com/office/drawing/2010/main" w="9525">
                   <a:solidFill>
                     <a:srgbClr val="000000"/>
                   </a:solidFill>
@@ -660,7 +660,7 @@
             </a:ln>
             <a:extLst>
               <a:ext uri="{91240B29-F687-4f45-9708-019B960494DF}">
-                <a14:hiddenLine xmlns:a14="http://schemas.microsoft.com/office/drawing/2010/main" xmlns="" w="9525">
+                <a14:hiddenLine xmlns="" xmlns:a14="http://schemas.microsoft.com/office/drawing/2010/main" w="9525">
                   <a:solidFill>
                     <a:srgbClr val="000000"/>
                   </a:solidFill>
@@ -750,7 +750,7 @@
             </a:ln>
             <a:extLst>
               <a:ext uri="{91240B29-F687-4f45-9708-019B960494DF}">
-                <a14:hiddenLine xmlns:a14="http://schemas.microsoft.com/office/drawing/2010/main" xmlns="" w="9525">
+                <a14:hiddenLine xmlns="" xmlns:a14="http://schemas.microsoft.com/office/drawing/2010/main" w="9525">
                   <a:solidFill>
                     <a:srgbClr val="000000"/>
                   </a:solidFill>
@@ -812,7 +812,7 @@
             </a:ln>
             <a:extLst>
               <a:ext uri="{91240B29-F687-4f45-9708-019B960494DF}">
-                <a14:hiddenLine xmlns:a14="http://schemas.microsoft.com/office/drawing/2010/main" xmlns="" w="9525">
+                <a14:hiddenLine xmlns="" xmlns:a14="http://schemas.microsoft.com/office/drawing/2010/main" w="9525">
                   <a:solidFill>
                     <a:srgbClr val="000000"/>
                   </a:solidFill>
@@ -874,7 +874,7 @@
             </a:ln>
             <a:extLst>
               <a:ext uri="{91240B29-F687-4f45-9708-019B960494DF}">
-                <a14:hiddenLine xmlns:a14="http://schemas.microsoft.com/office/drawing/2010/main" xmlns="" w="9525">
+                <a14:hiddenLine xmlns="" xmlns:a14="http://schemas.microsoft.com/office/drawing/2010/main" w="9525">
                   <a:solidFill>
                     <a:srgbClr val="000000"/>
                   </a:solidFill>
@@ -964,7 +964,7 @@
             </a:ln>
             <a:extLst>
               <a:ext uri="{91240B29-F687-4f45-9708-019B960494DF}">
-                <a14:hiddenLine xmlns:a14="http://schemas.microsoft.com/office/drawing/2010/main" xmlns="" w="9525">
+                <a14:hiddenLine xmlns="" xmlns:a14="http://schemas.microsoft.com/office/drawing/2010/main" w="9525">
                   <a:solidFill>
                     <a:srgbClr val="000000"/>
                   </a:solidFill>
@@ -1054,7 +1054,7 @@
             </a:ln>
             <a:extLst>
               <a:ext uri="{91240B29-F687-4f45-9708-019B960494DF}">
-                <a14:hiddenLine xmlns:a14="http://schemas.microsoft.com/office/drawing/2010/main" xmlns="" w="9525">
+                <a14:hiddenLine xmlns="" xmlns:a14="http://schemas.microsoft.com/office/drawing/2010/main" w="9525">
                   <a:solidFill>
                     <a:srgbClr val="000000"/>
                   </a:solidFill>
@@ -1116,7 +1116,7 @@
             </a:ln>
             <a:extLst>
               <a:ext uri="{91240B29-F687-4f45-9708-019B960494DF}">
-                <a14:hiddenLine xmlns:a14="http://schemas.microsoft.com/office/drawing/2010/main" xmlns="" w="9525">
+                <a14:hiddenLine xmlns="" xmlns:a14="http://schemas.microsoft.com/office/drawing/2010/main" w="9525">
                   <a:solidFill>
                     <a:srgbClr val="000000"/>
                   </a:solidFill>
@@ -1226,7 +1226,7 @@
             </a:ln>
             <a:extLst>
               <a:ext uri="{91240B29-F687-4f45-9708-019B960494DF}">
-                <a14:hiddenLine xmlns:a14="http://schemas.microsoft.com/office/drawing/2010/main" xmlns="" w="9525">
+                <a14:hiddenLine xmlns="" xmlns:a14="http://schemas.microsoft.com/office/drawing/2010/main" w="9525">
                   <a:solidFill>
                     <a:srgbClr val="000000"/>
                   </a:solidFill>
@@ -1288,7 +1288,7 @@
             </a:ln>
             <a:extLst>
               <a:ext uri="{91240B29-F687-4f45-9708-019B960494DF}">
-                <a14:hiddenLine xmlns:a14="http://schemas.microsoft.com/office/drawing/2010/main" xmlns="" w="9525">
+                <a14:hiddenLine xmlns="" xmlns:a14="http://schemas.microsoft.com/office/drawing/2010/main" w="9525">
                   <a:solidFill>
                     <a:srgbClr val="000000"/>
                   </a:solidFill>
@@ -1378,7 +1378,7 @@
             </a:ln>
             <a:extLst>
               <a:ext uri="{91240B29-F687-4f45-9708-019B960494DF}">
-                <a14:hiddenLine xmlns:a14="http://schemas.microsoft.com/office/drawing/2010/main" xmlns="" w="9525">
+                <a14:hiddenLine xmlns="" xmlns:a14="http://schemas.microsoft.com/office/drawing/2010/main" w="9525">
                   <a:solidFill>
                     <a:srgbClr val="000000"/>
                   </a:solidFill>
@@ -1468,7 +1468,7 @@
             </a:ln>
             <a:extLst>
               <a:ext uri="{91240B29-F687-4f45-9708-019B960494DF}">
-                <a14:hiddenLine xmlns:a14="http://schemas.microsoft.com/office/drawing/2010/main" xmlns="" w="9525">
+                <a14:hiddenLine xmlns="" xmlns:a14="http://schemas.microsoft.com/office/drawing/2010/main" w="9525">
                   <a:solidFill>
                     <a:srgbClr val="000000"/>
                   </a:solidFill>
@@ -1530,7 +1530,7 @@
             </a:ln>
             <a:extLst>
               <a:ext uri="{91240B29-F687-4f45-9708-019B960494DF}">
-                <a14:hiddenLine xmlns:a14="http://schemas.microsoft.com/office/drawing/2010/main" xmlns="" w="9525">
+                <a14:hiddenLine xmlns="" xmlns:a14="http://schemas.microsoft.com/office/drawing/2010/main" w="9525">
                   <a:solidFill>
                     <a:srgbClr val="000000"/>
                   </a:solidFill>
@@ -1620,7 +1620,7 @@
             </a:ln>
             <a:extLst>
               <a:ext uri="{91240B29-F687-4f45-9708-019B960494DF}">
-                <a14:hiddenLine xmlns:a14="http://schemas.microsoft.com/office/drawing/2010/main" xmlns="" w="9525">
+                <a14:hiddenLine xmlns="" xmlns:a14="http://schemas.microsoft.com/office/drawing/2010/main" w="9525">
                   <a:solidFill>
                     <a:srgbClr val="000000"/>
                   </a:solidFill>
@@ -1710,7 +1710,7 @@
             </a:ln>
             <a:extLst>
               <a:ext uri="{91240B29-F687-4f45-9708-019B960494DF}">
-                <a14:hiddenLine xmlns:a14="http://schemas.microsoft.com/office/drawing/2010/main" xmlns="" w="9525">
+                <a14:hiddenLine xmlns="" xmlns:a14="http://schemas.microsoft.com/office/drawing/2010/main" w="9525">
                   <a:solidFill>
                     <a:srgbClr val="000000"/>
                   </a:solidFill>
@@ -1766,7 +1766,7 @@
             </a:ln>
             <a:extLst>
               <a:ext uri="{91240B29-F687-4f45-9708-019B960494DF}">
-                <a14:hiddenLine xmlns:a14="http://schemas.microsoft.com/office/drawing/2010/main" xmlns="" w="9525">
+                <a14:hiddenLine xmlns="" xmlns:a14="http://schemas.microsoft.com/office/drawing/2010/main" w="9525">
                   <a:solidFill>
                     <a:srgbClr val="000000"/>
                   </a:solidFill>
@@ -1856,7 +1856,7 @@
             </a:ln>
             <a:extLst>
               <a:ext uri="{91240B29-F687-4f45-9708-019B960494DF}">
-                <a14:hiddenLine xmlns:a14="http://schemas.microsoft.com/office/drawing/2010/main" xmlns="" w="9525">
+                <a14:hiddenLine xmlns="" xmlns:a14="http://schemas.microsoft.com/office/drawing/2010/main" w="9525">
                   <a:solidFill>
                     <a:srgbClr val="000000"/>
                   </a:solidFill>
@@ -1912,7 +1912,7 @@
             </a:ln>
             <a:extLst>
               <a:ext uri="{91240B29-F687-4f45-9708-019B960494DF}">
-                <a14:hiddenLine xmlns:a14="http://schemas.microsoft.com/office/drawing/2010/main" xmlns="" w="9525">
+                <a14:hiddenLine xmlns="" xmlns:a14="http://schemas.microsoft.com/office/drawing/2010/main" w="9525">
                   <a:solidFill>
                     <a:srgbClr val="000000"/>
                   </a:solidFill>
@@ -2002,7 +2002,7 @@
             </a:ln>
             <a:extLst>
               <a:ext uri="{91240B29-F687-4f45-9708-019B960494DF}">
-                <a14:hiddenLine xmlns:a14="http://schemas.microsoft.com/office/drawing/2010/main" xmlns="" w="9525">
+                <a14:hiddenLine xmlns="" xmlns:a14="http://schemas.microsoft.com/office/drawing/2010/main" w="9525">
                   <a:solidFill>
                     <a:srgbClr val="000000"/>
                   </a:solidFill>
@@ -2070,7 +2070,7 @@
             </a:ln>
             <a:extLst>
               <a:ext uri="{91240B29-F687-4f45-9708-019B960494DF}">
-                <a14:hiddenLine xmlns:a14="http://schemas.microsoft.com/office/drawing/2010/main" xmlns="" w="9525">
+                <a14:hiddenLine xmlns="" xmlns:a14="http://schemas.microsoft.com/office/drawing/2010/main" w="9525">
                   <a:solidFill>
                     <a:srgbClr val="000000"/>
                   </a:solidFill>
@@ -2160,7 +2160,7 @@
             </a:ln>
             <a:extLst>
               <a:ext uri="{91240B29-F687-4f45-9708-019B960494DF}">
-                <a14:hiddenLine xmlns:a14="http://schemas.microsoft.com/office/drawing/2010/main" xmlns="" w="9525">
+                <a14:hiddenLine xmlns="" xmlns:a14="http://schemas.microsoft.com/office/drawing/2010/main" w="9525">
                   <a:solidFill>
                     <a:srgbClr val="000000"/>
                   </a:solidFill>
@@ -2228,7 +2228,7 @@
             </a:ln>
             <a:extLst>
               <a:ext uri="{91240B29-F687-4f45-9708-019B960494DF}">
-                <a14:hiddenLine xmlns:a14="http://schemas.microsoft.com/office/drawing/2010/main" xmlns="" w="9525">
+                <a14:hiddenLine xmlns="" xmlns:a14="http://schemas.microsoft.com/office/drawing/2010/main" w="9525">
                   <a:solidFill>
                     <a:srgbClr val="000000"/>
                   </a:solidFill>
@@ -2318,7 +2318,7 @@
             </a:ln>
             <a:extLst>
               <a:ext uri="{91240B29-F687-4f45-9708-019B960494DF}">
-                <a14:hiddenLine xmlns:a14="http://schemas.microsoft.com/office/drawing/2010/main" xmlns="" w="9525">
+                <a14:hiddenLine xmlns="" xmlns:a14="http://schemas.microsoft.com/office/drawing/2010/main" w="9525">
                   <a:solidFill>
                     <a:srgbClr val="000000"/>
                   </a:solidFill>
@@ -2352,7 +2352,7 @@
             </a:ln>
             <a:extLst>
               <a:ext uri="{91240B29-F687-4f45-9708-019B960494DF}">
-                <a14:hiddenLine xmlns:a14="http://schemas.microsoft.com/office/drawing/2010/main" xmlns="" w="9525">
+                <a14:hiddenLine xmlns="" xmlns:a14="http://schemas.microsoft.com/office/drawing/2010/main" w="9525">
                   <a:solidFill>
                     <a:srgbClr val="000000"/>
                   </a:solidFill>
@@ -2442,7 +2442,7 @@
             </a:ln>
             <a:extLst>
               <a:ext uri="{91240B29-F687-4f45-9708-019B960494DF}">
-                <a14:hiddenLine xmlns:a14="http://schemas.microsoft.com/office/drawing/2010/main" xmlns="" w="9525">
+                <a14:hiddenLine xmlns="" xmlns:a14="http://schemas.microsoft.com/office/drawing/2010/main" w="9525">
                   <a:solidFill>
                     <a:srgbClr val="000000"/>
                   </a:solidFill>
@@ -2504,7 +2504,7 @@
             </a:ln>
             <a:extLst>
               <a:ext uri="{91240B29-F687-4f45-9708-019B960494DF}">
-                <a14:hiddenLine xmlns:a14="http://schemas.microsoft.com/office/drawing/2010/main" xmlns="" w="9525">
+                <a14:hiddenLine xmlns="" xmlns:a14="http://schemas.microsoft.com/office/drawing/2010/main" w="9525">
                   <a:solidFill>
                     <a:srgbClr val="000000"/>
                   </a:solidFill>
@@ -2566,7 +2566,7 @@
             </a:ln>
             <a:extLst>
               <a:ext uri="{91240B29-F687-4f45-9708-019B960494DF}">
-                <a14:hiddenLine xmlns:a14="http://schemas.microsoft.com/office/drawing/2010/main" xmlns="" w="9525">
+                <a14:hiddenLine xmlns="" xmlns:a14="http://schemas.microsoft.com/office/drawing/2010/main" w="9525">
                   <a:solidFill>
                     <a:srgbClr val="000000"/>
                   </a:solidFill>
@@ -2656,7 +2656,7 @@
             </a:ln>
             <a:extLst>
               <a:ext uri="{91240B29-F687-4f45-9708-019B960494DF}">
-                <a14:hiddenLine xmlns:a14="http://schemas.microsoft.com/office/drawing/2010/main" xmlns="" w="9525">
+                <a14:hiddenLine xmlns="" xmlns:a14="http://schemas.microsoft.com/office/drawing/2010/main" w="9525">
                   <a:solidFill>
                     <a:srgbClr val="000000"/>
                   </a:solidFill>
@@ -2724,7 +2724,7 @@
             </a:ln>
             <a:extLst>
               <a:ext uri="{91240B29-F687-4f45-9708-019B960494DF}">
-                <a14:hiddenLine xmlns:a14="http://schemas.microsoft.com/office/drawing/2010/main" xmlns="" w="9525">
+                <a14:hiddenLine xmlns="" xmlns:a14="http://schemas.microsoft.com/office/drawing/2010/main" w="9525">
                   <a:solidFill>
                     <a:srgbClr val="000000"/>
                   </a:solidFill>
@@ -2786,7 +2786,7 @@
             </a:ln>
             <a:extLst>
               <a:ext uri="{91240B29-F687-4f45-9708-019B960494DF}">
-                <a14:hiddenLine xmlns:a14="http://schemas.microsoft.com/office/drawing/2010/main" xmlns="" w="9525">
+                <a14:hiddenLine xmlns="" xmlns:a14="http://schemas.microsoft.com/office/drawing/2010/main" w="9525">
                   <a:solidFill>
                     <a:srgbClr val="000000"/>
                   </a:solidFill>
@@ -2876,7 +2876,7 @@
             </a:ln>
             <a:extLst>
               <a:ext uri="{91240B29-F687-4f45-9708-019B960494DF}">
-                <a14:hiddenLine xmlns:a14="http://schemas.microsoft.com/office/drawing/2010/main" xmlns="" w="9525">
+                <a14:hiddenLine xmlns="" xmlns:a14="http://schemas.microsoft.com/office/drawing/2010/main" w="9525">
                   <a:solidFill>
                     <a:srgbClr val="000000"/>
                   </a:solidFill>
@@ -2938,7 +2938,7 @@
             </a:ln>
             <a:extLst>
               <a:ext uri="{91240B29-F687-4f45-9708-019B960494DF}">
-                <a14:hiddenLine xmlns:a14="http://schemas.microsoft.com/office/drawing/2010/main" xmlns="" w="9525">
+                <a14:hiddenLine xmlns="" xmlns:a14="http://schemas.microsoft.com/office/drawing/2010/main" w="9525">
                   <a:solidFill>
                     <a:srgbClr val="000000"/>
                   </a:solidFill>
@@ -3028,7 +3028,7 @@
             </a:ln>
             <a:extLst>
               <a:ext uri="{91240B29-F687-4f45-9708-019B960494DF}">
-                <a14:hiddenLine xmlns:a14="http://schemas.microsoft.com/office/drawing/2010/main" xmlns="" w="9525">
+                <a14:hiddenLine xmlns="" xmlns:a14="http://schemas.microsoft.com/office/drawing/2010/main" w="9525">
                   <a:solidFill>
                     <a:srgbClr val="000000"/>
                   </a:solidFill>
@@ -3090,7 +3090,7 @@
             </a:ln>
             <a:extLst>
               <a:ext uri="{91240B29-F687-4f45-9708-019B960494DF}">
-                <a14:hiddenLine xmlns:a14="http://schemas.microsoft.com/office/drawing/2010/main" xmlns="" w="9525">
+                <a14:hiddenLine xmlns="" xmlns:a14="http://schemas.microsoft.com/office/drawing/2010/main" w="9525">
                   <a:solidFill>
                     <a:srgbClr val="000000"/>
                   </a:solidFill>
@@ -3180,7 +3180,7 @@
             </a:ln>
             <a:extLst>
               <a:ext uri="{91240B29-F687-4f45-9708-019B960494DF}">
-                <a14:hiddenLine xmlns:a14="http://schemas.microsoft.com/office/drawing/2010/main" xmlns="" w="9525">
+                <a14:hiddenLine xmlns="" xmlns:a14="http://schemas.microsoft.com/office/drawing/2010/main" w="9525">
                   <a:solidFill>
                     <a:srgbClr val="000000"/>
                   </a:solidFill>
@@ -3214,7 +3214,7 @@
             </a:ln>
             <a:extLst>
               <a:ext uri="{91240B29-F687-4f45-9708-019B960494DF}">
-                <a14:hiddenLine xmlns:a14="http://schemas.microsoft.com/office/drawing/2010/main" xmlns="" w="9525">
+                <a14:hiddenLine xmlns="" xmlns:a14="http://schemas.microsoft.com/office/drawing/2010/main" w="9525">
                   <a:solidFill>
                     <a:srgbClr val="000000"/>
                   </a:solidFill>
@@ -3279,7 +3279,7 @@
             </a:ln>
             <a:extLst>
               <a:ext uri="{91240B29-F687-4f45-9708-019B960494DF}">
-                <a14:hiddenLine xmlns:a14="http://schemas.microsoft.com/office/drawing/2010/main" xmlns="" w="9525">
+                <a14:hiddenLine xmlns="" xmlns:a14="http://schemas.microsoft.com/office/drawing/2010/main" w="9525">
                   <a:solidFill>
                     <a:srgbClr val="000000"/>
                   </a:solidFill>
@@ -3369,7 +3369,7 @@
             </a:ln>
             <a:extLst>
               <a:ext uri="{91240B29-F687-4f45-9708-019B960494DF}">
-                <a14:hiddenLine xmlns:a14="http://schemas.microsoft.com/office/drawing/2010/main" xmlns="" w="9525">
+                <a14:hiddenLine xmlns="" xmlns:a14="http://schemas.microsoft.com/office/drawing/2010/main" w="9525">
                   <a:solidFill>
                     <a:srgbClr val="000000"/>
                   </a:solidFill>
@@ -3431,7 +3431,7 @@
             </a:ln>
             <a:extLst>
               <a:ext uri="{91240B29-F687-4f45-9708-019B960494DF}">
-                <a14:hiddenLine xmlns:a14="http://schemas.microsoft.com/office/drawing/2010/main" xmlns="" w="9525">
+                <a14:hiddenLine xmlns="" xmlns:a14="http://schemas.microsoft.com/office/drawing/2010/main" w="9525">
                   <a:solidFill>
                     <a:srgbClr val="000000"/>
                   </a:solidFill>
@@ -3521,7 +3521,7 @@
             </a:ln>
             <a:extLst>
               <a:ext uri="{91240B29-F687-4f45-9708-019B960494DF}">
-                <a14:hiddenLine xmlns:a14="http://schemas.microsoft.com/office/drawing/2010/main" xmlns="" w="9525">
+                <a14:hiddenLine xmlns="" xmlns:a14="http://schemas.microsoft.com/office/drawing/2010/main" w="9525">
                   <a:solidFill>
                     <a:srgbClr val="000000"/>
                   </a:solidFill>
@@ -3611,7 +3611,7 @@
             </a:ln>
             <a:extLst>
               <a:ext uri="{91240B29-F687-4f45-9708-019B960494DF}">
-                <a14:hiddenLine xmlns:a14="http://schemas.microsoft.com/office/drawing/2010/main" xmlns="" w="9525">
+                <a14:hiddenLine xmlns="" xmlns:a14="http://schemas.microsoft.com/office/drawing/2010/main" w="9525">
                   <a:solidFill>
                     <a:srgbClr val="000000"/>
                   </a:solidFill>
@@ -3676,7 +3676,7 @@
             </a:ln>
             <a:extLst>
               <a:ext uri="{91240B29-F687-4f45-9708-019B960494DF}">
-                <a14:hiddenLine xmlns:a14="http://schemas.microsoft.com/office/drawing/2010/main" xmlns="" w="9525">
+                <a14:hiddenLine xmlns="" xmlns:a14="http://schemas.microsoft.com/office/drawing/2010/main" w="9525">
                   <a:solidFill>
                     <a:srgbClr val="000000"/>
                   </a:solidFill>
@@ -3738,7 +3738,7 @@
             </a:ln>
             <a:extLst>
               <a:ext uri="{91240B29-F687-4f45-9708-019B960494DF}">
-                <a14:hiddenLine xmlns:a14="http://schemas.microsoft.com/office/drawing/2010/main" xmlns="" w="9525">
+                <a14:hiddenLine xmlns="" xmlns:a14="http://schemas.microsoft.com/office/drawing/2010/main" w="9525">
                   <a:solidFill>
                     <a:srgbClr val="000000"/>
                   </a:solidFill>
@@ -3828,7 +3828,7 @@
             </a:ln>
             <a:extLst>
               <a:ext uri="{91240B29-F687-4f45-9708-019B960494DF}">
-                <a14:hiddenLine xmlns:a14="http://schemas.microsoft.com/office/drawing/2010/main" xmlns="" w="9525">
+                <a14:hiddenLine xmlns="" xmlns:a14="http://schemas.microsoft.com/office/drawing/2010/main" w="9525">
                   <a:solidFill>
                     <a:srgbClr val="000000"/>
                   </a:solidFill>
@@ -3918,7 +3918,7 @@
             </a:ln>
             <a:extLst>
               <a:ext uri="{91240B29-F687-4f45-9708-019B960494DF}">
-                <a14:hiddenLine xmlns:a14="http://schemas.microsoft.com/office/drawing/2010/main" xmlns="" w="9525">
+                <a14:hiddenLine xmlns="" xmlns:a14="http://schemas.microsoft.com/office/drawing/2010/main" w="9525">
                   <a:solidFill>
                     <a:srgbClr val="000000"/>
                   </a:solidFill>
@@ -3980,7 +3980,7 @@
             </a:ln>
             <a:extLst>
               <a:ext uri="{91240B29-F687-4f45-9708-019B960494DF}">
-                <a14:hiddenLine xmlns:a14="http://schemas.microsoft.com/office/drawing/2010/main" xmlns="" w="9525">
+                <a14:hiddenLine xmlns="" xmlns:a14="http://schemas.microsoft.com/office/drawing/2010/main" w="9525">
                   <a:solidFill>
                     <a:srgbClr val="000000"/>
                   </a:solidFill>
@@ -4100,7 +4100,7 @@
             </a:ln>
             <a:extLst>
               <a:ext uri="{91240B29-F687-4f45-9708-019B960494DF}">
-                <a14:hiddenLine xmlns:a14="http://schemas.microsoft.com/office/drawing/2010/main" xmlns="" w="9525">
+                <a14:hiddenLine xmlns="" xmlns:a14="http://schemas.microsoft.com/office/drawing/2010/main" w="9525">
                   <a:solidFill>
                     <a:srgbClr val="000000"/>
                   </a:solidFill>
@@ -4168,7 +4168,7 @@
             </a:ln>
             <a:extLst>
               <a:ext uri="{91240B29-F687-4f45-9708-019B960494DF}">
-                <a14:hiddenLine xmlns:a14="http://schemas.microsoft.com/office/drawing/2010/main" xmlns="" w="9525">
+                <a14:hiddenLine xmlns="" xmlns:a14="http://schemas.microsoft.com/office/drawing/2010/main" w="9525">
                   <a:solidFill>
                     <a:srgbClr val="000000"/>
                   </a:solidFill>
@@ -4258,7 +4258,7 @@
             </a:ln>
             <a:extLst>
               <a:ext uri="{91240B29-F687-4f45-9708-019B960494DF}">
-                <a14:hiddenLine xmlns:a14="http://schemas.microsoft.com/office/drawing/2010/main" xmlns="" w="9525">
+                <a14:hiddenLine xmlns="" xmlns:a14="http://schemas.microsoft.com/office/drawing/2010/main" w="9525">
                   <a:solidFill>
                     <a:srgbClr val="000000"/>
                   </a:solidFill>
@@ -4298,7 +4298,7 @@
           </a:lstStyle>
           <a:p>
             <a:r>
-              <a:rPr lang="en-US" smtClean="0"/>
+              <a:rPr lang="en-US"/>
               <a:t>Click to edit Master title style</a:t>
             </a:r>
             <a:endParaRPr lang="en-US" dirty="0"/>
@@ -4369,7 +4369,7 @@
           </a:lstStyle>
           <a:p>
             <a:r>
-              <a:rPr lang="en-US" smtClean="0"/>
+              <a:rPr lang="en-US"/>
               <a:t>Click to edit Master subtitle style</a:t>
             </a:r>
             <a:endParaRPr lang="en-US" dirty="0"/>
@@ -4398,7 +4398,7 @@
           <a:p>
             <a:fld id="{C5DA069D-2E5B-4FFF-BEBF-3DA0AC684B9D}" type="datetimeFigureOut">
               <a:rPr lang="en-US" smtClean="0"/>
-              <a:t>12/11/2016</a:t>
+              <a:t>12/12/2016</a:t>
             </a:fld>
             <a:endParaRPr lang="en-US"/>
           </a:p>
@@ -4513,7 +4513,7 @@
           </a:lstStyle>
           <a:p>
             <a:r>
-              <a:rPr lang="en-US" smtClean="0"/>
+              <a:rPr lang="en-US"/>
               <a:t>Click to edit Master title style</a:t>
             </a:r>
             <a:endParaRPr lang="en-US" dirty="0"/>
@@ -4574,7 +4574,7 @@
               <a:buNone/>
             </a:pPr>
             <a:r>
-              <a:rPr lang="en-US" smtClean="0"/>
+              <a:rPr lang="en-US"/>
               <a:t>Click icon to add picture</a:t>
             </a:r>
             <a:endParaRPr lang="en-US" dirty="0"/>
@@ -4642,7 +4642,7 @@
           <a:p>
             <a:pPr lvl="0"/>
             <a:r>
-              <a:rPr lang="en-US" smtClean="0"/>
+              <a:rPr lang="en-US"/>
               <a:t>Click to edit Master text styles</a:t>
             </a:r>
           </a:p>
@@ -4665,7 +4665,7 @@
           <a:p>
             <a:fld id="{C5DA069D-2E5B-4FFF-BEBF-3DA0AC684B9D}" type="datetimeFigureOut">
               <a:rPr lang="en-US" smtClean="0"/>
-              <a:t>12/11/2016</a:t>
+              <a:t>12/12/2016</a:t>
             </a:fld>
             <a:endParaRPr lang="en-US"/>
           </a:p>
@@ -4770,7 +4770,7 @@
           </a:lstStyle>
           <a:p>
             <a:r>
-              <a:rPr lang="en-US" smtClean="0"/>
+              <a:rPr lang="en-US"/>
               <a:t>Click to edit Master title style</a:t>
             </a:r>
             <a:endParaRPr lang="en-US" dirty="0"/>
@@ -4838,7 +4838,7 @@
           <a:p>
             <a:pPr lvl="0"/>
             <a:r>
-              <a:rPr lang="en-US" smtClean="0"/>
+              <a:rPr lang="en-US"/>
               <a:t>Click to edit Master text styles</a:t>
             </a:r>
           </a:p>
@@ -4861,7 +4861,7 @@
           <a:p>
             <a:fld id="{C5DA069D-2E5B-4FFF-BEBF-3DA0AC684B9D}" type="datetimeFigureOut">
               <a:rPr lang="en-US" smtClean="0"/>
-              <a:t>12/11/2016</a:t>
+              <a:t>12/12/2016</a:t>
             </a:fld>
             <a:endParaRPr lang="en-US"/>
           </a:p>
@@ -4966,7 +4966,7 @@
           </a:lstStyle>
           <a:p>
             <a:r>
-              <a:rPr lang="en-US" smtClean="0"/>
+              <a:rPr lang="en-US"/>
               <a:t>Click to edit Master title style</a:t>
             </a:r>
             <a:endParaRPr lang="en-US" dirty="0"/>
@@ -5034,7 +5034,7 @@
           <a:p>
             <a:pPr lvl="0"/>
             <a:r>
-              <a:rPr lang="en-US" smtClean="0"/>
+              <a:rPr lang="en-US"/>
               <a:t>Click to edit Master text styles</a:t>
             </a:r>
           </a:p>
@@ -5101,7 +5101,7 @@
           <a:p>
             <a:pPr lvl="0"/>
             <a:r>
-              <a:rPr lang="en-US" smtClean="0"/>
+              <a:rPr lang="en-US"/>
               <a:t>Click to edit Master text styles</a:t>
             </a:r>
           </a:p>
@@ -5124,7 +5124,7 @@
           <a:p>
             <a:fld id="{C5DA069D-2E5B-4FFF-BEBF-3DA0AC684B9D}" type="datetimeFigureOut">
               <a:rPr lang="en-US" smtClean="0"/>
-              <a:t>12/11/2016</a:t>
+              <a:t>12/12/2016</a:t>
             </a:fld>
             <a:endParaRPr lang="en-US"/>
           </a:p>
@@ -5467,7 +5467,7 @@
           </a:lstStyle>
           <a:p>
             <a:r>
-              <a:rPr lang="en-US" smtClean="0"/>
+              <a:rPr lang="en-US"/>
               <a:t>Click to edit Master title style</a:t>
             </a:r>
             <a:endParaRPr lang="en-US" dirty="0"/>
@@ -5535,7 +5535,7 @@
           <a:p>
             <a:pPr lvl="0"/>
             <a:r>
-              <a:rPr lang="en-US" smtClean="0"/>
+              <a:rPr lang="en-US"/>
               <a:t>Click to edit Master text styles</a:t>
             </a:r>
           </a:p>
@@ -5558,7 +5558,7 @@
           <a:p>
             <a:fld id="{C5DA069D-2E5B-4FFF-BEBF-3DA0AC684B9D}" type="datetimeFigureOut">
               <a:rPr lang="en-US" smtClean="0"/>
-              <a:t>12/11/2016</a:t>
+              <a:t>12/12/2016</a:t>
             </a:fld>
             <a:endParaRPr lang="en-US"/>
           </a:p>
@@ -5657,7 +5657,7 @@
           <a:lstStyle/>
           <a:p>
             <a:r>
-              <a:rPr lang="en-US" smtClean="0"/>
+              <a:rPr lang="en-US"/>
               <a:t>Click to edit Master title style</a:t>
             </a:r>
             <a:endParaRPr lang="en-US" dirty="0"/>
@@ -5732,7 +5732,7 @@
           <a:p>
             <a:pPr lvl="0"/>
             <a:r>
-              <a:rPr lang="en-US" smtClean="0"/>
+              <a:rPr lang="en-US"/>
               <a:t>Click to edit Master text styles</a:t>
             </a:r>
           </a:p>
@@ -5799,7 +5799,7 @@
           <a:p>
             <a:pPr lvl="0"/>
             <a:r>
-              <a:rPr lang="en-US" smtClean="0"/>
+              <a:rPr lang="en-US"/>
               <a:t>Click to edit Master text styles</a:t>
             </a:r>
           </a:p>
@@ -5873,7 +5873,7 @@
           <a:p>
             <a:pPr lvl="0"/>
             <a:r>
-              <a:rPr lang="en-US" smtClean="0"/>
+              <a:rPr lang="en-US"/>
               <a:t>Click to edit Master text styles</a:t>
             </a:r>
           </a:p>
@@ -5940,7 +5940,7 @@
           <a:p>
             <a:pPr lvl="0"/>
             <a:r>
-              <a:rPr lang="en-US" smtClean="0"/>
+              <a:rPr lang="en-US"/>
               <a:t>Click to edit Master text styles</a:t>
             </a:r>
           </a:p>
@@ -6014,7 +6014,7 @@
           <a:p>
             <a:pPr lvl="0"/>
             <a:r>
-              <a:rPr lang="en-US" smtClean="0"/>
+              <a:rPr lang="en-US"/>
               <a:t>Click to edit Master text styles</a:t>
             </a:r>
           </a:p>
@@ -6081,7 +6081,7 @@
           <a:p>
             <a:pPr lvl="0"/>
             <a:r>
-              <a:rPr lang="en-US" smtClean="0"/>
+              <a:rPr lang="en-US"/>
               <a:t>Click to edit Master text styles</a:t>
             </a:r>
           </a:p>
@@ -6104,7 +6104,7 @@
           <a:p>
             <a:fld id="{C5DA069D-2E5B-4FFF-BEBF-3DA0AC684B9D}" type="datetimeFigureOut">
               <a:rPr lang="en-US" smtClean="0"/>
-              <a:t>12/11/2016</a:t>
+              <a:t>12/12/2016</a:t>
             </a:fld>
             <a:endParaRPr lang="en-US"/>
           </a:p>
@@ -6203,7 +6203,7 @@
           <a:lstStyle/>
           <a:p>
             <a:r>
-              <a:rPr lang="en-US" smtClean="0"/>
+              <a:rPr lang="en-US"/>
               <a:t>Click to edit Master title style</a:t>
             </a:r>
             <a:endParaRPr lang="en-US" dirty="0"/>
@@ -6278,7 +6278,7 @@
           <a:p>
             <a:pPr lvl="0"/>
             <a:r>
-              <a:rPr lang="en-US" smtClean="0"/>
+              <a:rPr lang="en-US"/>
               <a:t>Click to edit Master text styles</a:t>
             </a:r>
           </a:p>
@@ -6335,7 +6335,7 @@
               <a:buNone/>
             </a:pPr>
             <a:r>
-              <a:rPr lang="en-US" smtClean="0"/>
+              <a:rPr lang="en-US"/>
               <a:t>Click icon to add picture</a:t>
             </a:r>
             <a:endParaRPr lang="en-US" dirty="0"/>
@@ -6403,7 +6403,7 @@
           <a:p>
             <a:pPr lvl="0"/>
             <a:r>
-              <a:rPr lang="en-US" smtClean="0"/>
+              <a:rPr lang="en-US"/>
               <a:t>Click to edit Master text styles</a:t>
             </a:r>
           </a:p>
@@ -6477,7 +6477,7 @@
           <a:p>
             <a:pPr lvl="0"/>
             <a:r>
-              <a:rPr lang="en-US" smtClean="0"/>
+              <a:rPr lang="en-US"/>
               <a:t>Click to edit Master text styles</a:t>
             </a:r>
           </a:p>
@@ -6534,7 +6534,7 @@
               <a:buNone/>
             </a:pPr>
             <a:r>
-              <a:rPr lang="en-US" smtClean="0"/>
+              <a:rPr lang="en-US"/>
               <a:t>Click icon to add picture</a:t>
             </a:r>
             <a:endParaRPr lang="en-US" dirty="0"/>
@@ -6602,7 +6602,7 @@
           <a:p>
             <a:pPr lvl="0"/>
             <a:r>
-              <a:rPr lang="en-US" smtClean="0"/>
+              <a:rPr lang="en-US"/>
               <a:t>Click to edit Master text styles</a:t>
             </a:r>
           </a:p>
@@ -6676,7 +6676,7 @@
           <a:p>
             <a:pPr lvl="0"/>
             <a:r>
-              <a:rPr lang="en-US" smtClean="0"/>
+              <a:rPr lang="en-US"/>
               <a:t>Click to edit Master text styles</a:t>
             </a:r>
           </a:p>
@@ -6733,7 +6733,7 @@
               <a:buNone/>
             </a:pPr>
             <a:r>
-              <a:rPr lang="en-US" smtClean="0"/>
+              <a:rPr lang="en-US"/>
               <a:t>Click icon to add picture</a:t>
             </a:r>
             <a:endParaRPr lang="en-US" dirty="0"/>
@@ -6801,7 +6801,7 @@
           <a:p>
             <a:pPr lvl="0"/>
             <a:r>
-              <a:rPr lang="en-US" smtClean="0"/>
+              <a:rPr lang="en-US"/>
               <a:t>Click to edit Master text styles</a:t>
             </a:r>
           </a:p>
@@ -6824,7 +6824,7 @@
           <a:p>
             <a:fld id="{C5DA069D-2E5B-4FFF-BEBF-3DA0AC684B9D}" type="datetimeFigureOut">
               <a:rPr lang="en-US" smtClean="0"/>
-              <a:t>12/11/2016</a:t>
+              <a:t>12/12/2016</a:t>
             </a:fld>
             <a:endParaRPr lang="en-US"/>
           </a:p>
@@ -6918,7 +6918,7 @@
           <a:lstStyle/>
           <a:p>
             <a:r>
-              <a:rPr lang="en-US" smtClean="0"/>
+              <a:rPr lang="en-US"/>
               <a:t>Click to edit Master title style</a:t>
             </a:r>
             <a:endParaRPr lang="en-US" dirty="0"/>
@@ -6942,35 +6942,35 @@
           <a:p>
             <a:pPr lvl="0"/>
             <a:r>
-              <a:rPr lang="en-US" smtClean="0"/>
+              <a:rPr lang="en-US"/>
               <a:t>Click to edit Master text styles</a:t>
             </a:r>
           </a:p>
           <a:p>
             <a:pPr lvl="1"/>
             <a:r>
-              <a:rPr lang="en-US" smtClean="0"/>
+              <a:rPr lang="en-US"/>
               <a:t>Second level</a:t>
             </a:r>
           </a:p>
           <a:p>
             <a:pPr lvl="2"/>
             <a:r>
-              <a:rPr lang="en-US" smtClean="0"/>
+              <a:rPr lang="en-US"/>
               <a:t>Third level</a:t>
             </a:r>
           </a:p>
           <a:p>
             <a:pPr lvl="3"/>
             <a:r>
-              <a:rPr lang="en-US" smtClean="0"/>
+              <a:rPr lang="en-US"/>
               <a:t>Fourth level</a:t>
             </a:r>
           </a:p>
           <a:p>
             <a:pPr lvl="4"/>
             <a:r>
-              <a:rPr lang="en-US" smtClean="0"/>
+              <a:rPr lang="en-US"/>
               <a:t>Fifth level</a:t>
             </a:r>
             <a:endParaRPr lang="en-US" dirty="0"/>
@@ -6994,7 +6994,7 @@
           <a:p>
             <a:fld id="{C5DA069D-2E5B-4FFF-BEBF-3DA0AC684B9D}" type="datetimeFigureOut">
               <a:rPr lang="en-US" smtClean="0"/>
-              <a:t>12/11/2016</a:t>
+              <a:t>12/12/2016</a:t>
             </a:fld>
             <a:endParaRPr lang="en-US"/>
           </a:p>
@@ -7093,7 +7093,7 @@
           <a:lstStyle/>
           <a:p>
             <a:r>
-              <a:rPr lang="en-US" smtClean="0"/>
+              <a:rPr lang="en-US"/>
               <a:t>Click to edit Master title style</a:t>
             </a:r>
             <a:endParaRPr lang="en-US" dirty="0"/>
@@ -7122,35 +7122,35 @@
           <a:p>
             <a:pPr lvl="0"/>
             <a:r>
-              <a:rPr lang="en-US" smtClean="0"/>
+              <a:rPr lang="en-US"/>
               <a:t>Click to edit Master text styles</a:t>
             </a:r>
           </a:p>
           <a:p>
             <a:pPr lvl="1"/>
             <a:r>
-              <a:rPr lang="en-US" smtClean="0"/>
+              <a:rPr lang="en-US"/>
               <a:t>Second level</a:t>
             </a:r>
           </a:p>
           <a:p>
             <a:pPr lvl="2"/>
             <a:r>
-              <a:rPr lang="en-US" smtClean="0"/>
+              <a:rPr lang="en-US"/>
               <a:t>Third level</a:t>
             </a:r>
           </a:p>
           <a:p>
             <a:pPr lvl="3"/>
             <a:r>
-              <a:rPr lang="en-US" smtClean="0"/>
+              <a:rPr lang="en-US"/>
               <a:t>Fourth level</a:t>
             </a:r>
           </a:p>
           <a:p>
             <a:pPr lvl="4"/>
             <a:r>
-              <a:rPr lang="en-US" smtClean="0"/>
+              <a:rPr lang="en-US"/>
               <a:t>Fifth level</a:t>
             </a:r>
             <a:endParaRPr lang="en-US" dirty="0"/>
@@ -7174,7 +7174,7 @@
           <a:p>
             <a:fld id="{C5DA069D-2E5B-4FFF-BEBF-3DA0AC684B9D}" type="datetimeFigureOut">
               <a:rPr lang="en-US" smtClean="0"/>
-              <a:t>12/11/2016</a:t>
+              <a:t>12/12/2016</a:t>
             </a:fld>
             <a:endParaRPr lang="en-US"/>
           </a:p>
@@ -7268,7 +7268,7 @@
           <a:lstStyle/>
           <a:p>
             <a:r>
-              <a:rPr lang="en-US" smtClean="0"/>
+              <a:rPr lang="en-US"/>
               <a:t>Click to edit Master title style</a:t>
             </a:r>
             <a:endParaRPr lang="en-US" dirty="0"/>
@@ -7292,35 +7292,35 @@
           <a:p>
             <a:pPr lvl="0"/>
             <a:r>
-              <a:rPr lang="en-US" smtClean="0"/>
+              <a:rPr lang="en-US"/>
               <a:t>Click to edit Master text styles</a:t>
             </a:r>
           </a:p>
           <a:p>
             <a:pPr lvl="1"/>
             <a:r>
-              <a:rPr lang="en-US" smtClean="0"/>
+              <a:rPr lang="en-US"/>
               <a:t>Second level</a:t>
             </a:r>
           </a:p>
           <a:p>
             <a:pPr lvl="2"/>
             <a:r>
-              <a:rPr lang="en-US" smtClean="0"/>
+              <a:rPr lang="en-US"/>
               <a:t>Third level</a:t>
             </a:r>
           </a:p>
           <a:p>
             <a:pPr lvl="3"/>
             <a:r>
-              <a:rPr lang="en-US" smtClean="0"/>
+              <a:rPr lang="en-US"/>
               <a:t>Fourth level</a:t>
             </a:r>
           </a:p>
           <a:p>
             <a:pPr lvl="4"/>
             <a:r>
-              <a:rPr lang="en-US" smtClean="0"/>
+              <a:rPr lang="en-US"/>
               <a:t>Fifth level</a:t>
             </a:r>
             <a:endParaRPr lang="en-US" dirty="0"/>
@@ -7344,7 +7344,7 @@
           <a:p>
             <a:fld id="{C5DA069D-2E5B-4FFF-BEBF-3DA0AC684B9D}" type="datetimeFigureOut">
               <a:rPr lang="en-US" smtClean="0"/>
-              <a:t>12/11/2016</a:t>
+              <a:t>12/12/2016</a:t>
             </a:fld>
             <a:endParaRPr lang="en-US"/>
           </a:p>
@@ -7449,7 +7449,7 @@
           </a:lstStyle>
           <a:p>
             <a:r>
-              <a:rPr lang="en-US" smtClean="0"/>
+              <a:rPr lang="en-US"/>
               <a:t>Click to edit Master title style</a:t>
             </a:r>
             <a:endParaRPr lang="en-US" dirty="0"/>
@@ -7571,7 +7571,7 @@
           <a:p>
             <a:pPr lvl="0"/>
             <a:r>
-              <a:rPr lang="en-US" smtClean="0"/>
+              <a:rPr lang="en-US"/>
               <a:t>Click to edit Master text styles</a:t>
             </a:r>
           </a:p>
@@ -7594,7 +7594,7 @@
           <a:p>
             <a:fld id="{C5DA069D-2E5B-4FFF-BEBF-3DA0AC684B9D}" type="datetimeFigureOut">
               <a:rPr lang="en-US" smtClean="0"/>
-              <a:t>12/11/2016</a:t>
+              <a:t>12/12/2016</a:t>
             </a:fld>
             <a:endParaRPr lang="en-US"/>
           </a:p>
@@ -7688,7 +7688,7 @@
           <a:lstStyle/>
           <a:p>
             <a:r>
-              <a:rPr lang="en-US" smtClean="0"/>
+              <a:rPr lang="en-US"/>
               <a:t>Click to edit Master title style</a:t>
             </a:r>
             <a:endParaRPr lang="en-US" dirty="0"/>
@@ -7717,35 +7717,35 @@
           <a:p>
             <a:pPr lvl="0"/>
             <a:r>
-              <a:rPr lang="en-US" smtClean="0"/>
+              <a:rPr lang="en-US"/>
               <a:t>Click to edit Master text styles</a:t>
             </a:r>
           </a:p>
           <a:p>
             <a:pPr lvl="1"/>
             <a:r>
-              <a:rPr lang="en-US" smtClean="0"/>
+              <a:rPr lang="en-US"/>
               <a:t>Second level</a:t>
             </a:r>
           </a:p>
           <a:p>
             <a:pPr lvl="2"/>
             <a:r>
-              <a:rPr lang="en-US" smtClean="0"/>
+              <a:rPr lang="en-US"/>
               <a:t>Third level</a:t>
             </a:r>
           </a:p>
           <a:p>
             <a:pPr lvl="3"/>
             <a:r>
-              <a:rPr lang="en-US" smtClean="0"/>
+              <a:rPr lang="en-US"/>
               <a:t>Fourth level</a:t>
             </a:r>
           </a:p>
           <a:p>
             <a:pPr lvl="4"/>
             <a:r>
-              <a:rPr lang="en-US" smtClean="0"/>
+              <a:rPr lang="en-US"/>
               <a:t>Fifth level</a:t>
             </a:r>
             <a:endParaRPr lang="en-US" dirty="0"/>
@@ -7774,35 +7774,35 @@
           <a:p>
             <a:pPr lvl="0"/>
             <a:r>
-              <a:rPr lang="en-US" smtClean="0"/>
+              <a:rPr lang="en-US"/>
               <a:t>Click to edit Master text styles</a:t>
             </a:r>
           </a:p>
           <a:p>
             <a:pPr lvl="1"/>
             <a:r>
-              <a:rPr lang="en-US" smtClean="0"/>
+              <a:rPr lang="en-US"/>
               <a:t>Second level</a:t>
             </a:r>
           </a:p>
           <a:p>
             <a:pPr lvl="2"/>
             <a:r>
-              <a:rPr lang="en-US" smtClean="0"/>
+              <a:rPr lang="en-US"/>
               <a:t>Third level</a:t>
             </a:r>
           </a:p>
           <a:p>
             <a:pPr lvl="3"/>
             <a:r>
-              <a:rPr lang="en-US" smtClean="0"/>
+              <a:rPr lang="en-US"/>
               <a:t>Fourth level</a:t>
             </a:r>
           </a:p>
           <a:p>
             <a:pPr lvl="4"/>
             <a:r>
-              <a:rPr lang="en-US" smtClean="0"/>
+              <a:rPr lang="en-US"/>
               <a:t>Fifth level</a:t>
             </a:r>
             <a:endParaRPr lang="en-US" dirty="0"/>
@@ -7826,7 +7826,7 @@
           <a:p>
             <a:fld id="{C5DA069D-2E5B-4FFF-BEBF-3DA0AC684B9D}" type="datetimeFigureOut">
               <a:rPr lang="en-US" smtClean="0"/>
-              <a:t>12/11/2016</a:t>
+              <a:t>12/12/2016</a:t>
             </a:fld>
             <a:endParaRPr lang="en-US"/>
           </a:p>
@@ -7930,7 +7930,7 @@
           <a:lstStyle/>
           <a:p>
             <a:r>
-              <a:rPr lang="en-US" smtClean="0"/>
+              <a:rPr lang="en-US"/>
               <a:t>Click to edit Master title style</a:t>
             </a:r>
             <a:endParaRPr lang="en-US" dirty="0"/>
@@ -8003,7 +8003,7 @@
           <a:p>
             <a:pPr lvl="0"/>
             <a:r>
-              <a:rPr lang="en-US" smtClean="0"/>
+              <a:rPr lang="en-US"/>
               <a:t>Click to edit Master text styles</a:t>
             </a:r>
           </a:p>
@@ -8031,35 +8031,35 @@
           <a:p>
             <a:pPr lvl="0"/>
             <a:r>
-              <a:rPr lang="en-US" smtClean="0"/>
+              <a:rPr lang="en-US"/>
               <a:t>Click to edit Master text styles</a:t>
             </a:r>
           </a:p>
           <a:p>
             <a:pPr lvl="1"/>
             <a:r>
-              <a:rPr lang="en-US" smtClean="0"/>
+              <a:rPr lang="en-US"/>
               <a:t>Second level</a:t>
             </a:r>
           </a:p>
           <a:p>
             <a:pPr lvl="2"/>
             <a:r>
-              <a:rPr lang="en-US" smtClean="0"/>
+              <a:rPr lang="en-US"/>
               <a:t>Third level</a:t>
             </a:r>
           </a:p>
           <a:p>
             <a:pPr lvl="3"/>
             <a:r>
-              <a:rPr lang="en-US" smtClean="0"/>
+              <a:rPr lang="en-US"/>
               <a:t>Fourth level</a:t>
             </a:r>
           </a:p>
           <a:p>
             <a:pPr lvl="4"/>
             <a:r>
-              <a:rPr lang="en-US" smtClean="0"/>
+              <a:rPr lang="en-US"/>
               <a:t>Fifth level</a:t>
             </a:r>
             <a:endParaRPr lang="en-US" dirty="0"/>
@@ -8132,7 +8132,7 @@
           <a:p>
             <a:pPr lvl="0"/>
             <a:r>
-              <a:rPr lang="en-US" smtClean="0"/>
+              <a:rPr lang="en-US"/>
               <a:t>Click to edit Master text styles</a:t>
             </a:r>
           </a:p>
@@ -8160,35 +8160,35 @@
           <a:p>
             <a:pPr lvl="0"/>
             <a:r>
-              <a:rPr lang="en-US" smtClean="0"/>
+              <a:rPr lang="en-US"/>
               <a:t>Click to edit Master text styles</a:t>
             </a:r>
           </a:p>
           <a:p>
             <a:pPr lvl="1"/>
             <a:r>
-              <a:rPr lang="en-US" smtClean="0"/>
+              <a:rPr lang="en-US"/>
               <a:t>Second level</a:t>
             </a:r>
           </a:p>
           <a:p>
             <a:pPr lvl="2"/>
             <a:r>
-              <a:rPr lang="en-US" smtClean="0"/>
+              <a:rPr lang="en-US"/>
               <a:t>Third level</a:t>
             </a:r>
           </a:p>
           <a:p>
             <a:pPr lvl="3"/>
             <a:r>
-              <a:rPr lang="en-US" smtClean="0"/>
+              <a:rPr lang="en-US"/>
               <a:t>Fourth level</a:t>
             </a:r>
           </a:p>
           <a:p>
             <a:pPr lvl="4"/>
             <a:r>
-              <a:rPr lang="en-US" smtClean="0"/>
+              <a:rPr lang="en-US"/>
               <a:t>Fifth level</a:t>
             </a:r>
             <a:endParaRPr lang="en-US" dirty="0"/>
@@ -8212,7 +8212,7 @@
           <a:p>
             <a:fld id="{C5DA069D-2E5B-4FFF-BEBF-3DA0AC684B9D}" type="datetimeFigureOut">
               <a:rPr lang="en-US" smtClean="0"/>
-              <a:t>12/11/2016</a:t>
+              <a:t>12/12/2016</a:t>
             </a:fld>
             <a:endParaRPr lang="en-US"/>
           </a:p>
@@ -8311,7 +8311,7 @@
           <a:lstStyle/>
           <a:p>
             <a:r>
-              <a:rPr lang="en-US" smtClean="0"/>
+              <a:rPr lang="en-US"/>
               <a:t>Click to edit Master title style</a:t>
             </a:r>
             <a:endParaRPr lang="en-US" dirty="0"/>
@@ -8335,7 +8335,7 @@
           <a:p>
             <a:fld id="{C5DA069D-2E5B-4FFF-BEBF-3DA0AC684B9D}" type="datetimeFigureOut">
               <a:rPr lang="en-US" smtClean="0"/>
-              <a:t>12/11/2016</a:t>
+              <a:t>12/12/2016</a:t>
             </a:fld>
             <a:endParaRPr lang="en-US"/>
           </a:p>
@@ -8430,7 +8430,7 @@
           <a:p>
             <a:fld id="{C5DA069D-2E5B-4FFF-BEBF-3DA0AC684B9D}" type="datetimeFigureOut">
               <a:rPr lang="en-US" smtClean="0"/>
-              <a:t>12/11/2016</a:t>
+              <a:t>12/12/2016</a:t>
             </a:fld>
             <a:endParaRPr lang="en-US"/>
           </a:p>
@@ -8533,7 +8533,7 @@
           </a:lstStyle>
           <a:p>
             <a:r>
-              <a:rPr lang="en-US" smtClean="0"/>
+              <a:rPr lang="en-US"/>
               <a:t>Click to edit Master title style</a:t>
             </a:r>
             <a:endParaRPr lang="en-US" dirty="0"/>
@@ -8562,35 +8562,35 @@
           <a:p>
             <a:pPr lvl="0"/>
             <a:r>
-              <a:rPr lang="en-US" smtClean="0"/>
+              <a:rPr lang="en-US"/>
               <a:t>Click to edit Master text styles</a:t>
             </a:r>
           </a:p>
           <a:p>
             <a:pPr lvl="1"/>
             <a:r>
-              <a:rPr lang="en-US" smtClean="0"/>
+              <a:rPr lang="en-US"/>
               <a:t>Second level</a:t>
             </a:r>
           </a:p>
           <a:p>
             <a:pPr lvl="2"/>
             <a:r>
-              <a:rPr lang="en-US" smtClean="0"/>
+              <a:rPr lang="en-US"/>
               <a:t>Third level</a:t>
             </a:r>
           </a:p>
           <a:p>
             <a:pPr lvl="3"/>
             <a:r>
-              <a:rPr lang="en-US" smtClean="0"/>
+              <a:rPr lang="en-US"/>
               <a:t>Fourth level</a:t>
             </a:r>
           </a:p>
           <a:p>
             <a:pPr lvl="4"/>
             <a:r>
-              <a:rPr lang="en-US" smtClean="0"/>
+              <a:rPr lang="en-US"/>
               <a:t>Fifth level</a:t>
             </a:r>
             <a:endParaRPr lang="en-US" dirty="0"/>
@@ -8656,7 +8656,7 @@
           <a:p>
             <a:pPr lvl="0"/>
             <a:r>
-              <a:rPr lang="en-US" smtClean="0"/>
+              <a:rPr lang="en-US"/>
               <a:t>Click to edit Master text styles</a:t>
             </a:r>
           </a:p>
@@ -8679,7 +8679,7 @@
           <a:p>
             <a:fld id="{C5DA069D-2E5B-4FFF-BEBF-3DA0AC684B9D}" type="datetimeFigureOut">
               <a:rPr lang="en-US" smtClean="0"/>
-              <a:t>12/11/2016</a:t>
+              <a:t>12/12/2016</a:t>
             </a:fld>
             <a:endParaRPr lang="en-US"/>
           </a:p>
@@ -8787,7 +8787,7 @@
           </a:lstStyle>
           <a:p>
             <a:r>
-              <a:rPr lang="en-US" smtClean="0"/>
+              <a:rPr lang="en-US"/>
               <a:t>Click to edit Master title style</a:t>
             </a:r>
             <a:endParaRPr lang="en-US" dirty="0"/>
@@ -8875,7 +8875,7 @@
           </a:lstStyle>
           <a:p>
             <a:r>
-              <a:rPr lang="en-US" smtClean="0"/>
+              <a:rPr lang="en-US"/>
               <a:t>Click icon to add picture</a:t>
             </a:r>
             <a:endParaRPr lang="en-US" dirty="0"/>
@@ -8941,7 +8941,7 @@
           <a:p>
             <a:pPr lvl="0"/>
             <a:r>
-              <a:rPr lang="en-US" smtClean="0"/>
+              <a:rPr lang="en-US"/>
               <a:t>Click to edit Master text styles</a:t>
             </a:r>
           </a:p>
@@ -8964,7 +8964,7 @@
           <a:p>
             <a:fld id="{C5DA069D-2E5B-4FFF-BEBF-3DA0AC684B9D}" type="datetimeFigureOut">
               <a:rPr lang="en-US" smtClean="0"/>
-              <a:t>12/11/2016</a:t>
+              <a:t>12/12/2016</a:t>
             </a:fld>
             <a:endParaRPr lang="en-US"/>
           </a:p>
@@ -9087,7 +9087,7 @@
           <a:noFill/>
           <a:extLst>
             <a:ext uri="{909E8E84-426E-40dd-AFC4-6F175D3DCCD1}">
-              <a14:hiddenFill xmlns:a14="http://schemas.microsoft.com/office/drawing/2010/main" xmlns="">
+              <a14:hiddenFill xmlns="" xmlns:a14="http://schemas.microsoft.com/office/drawing/2010/main">
                 <a:solidFill>
                   <a:srgbClr val="FFFFFF"/>
                 </a:solidFill>
@@ -9161,7 +9161,7 @@
               </a:ln>
               <a:extLst>
                 <a:ext uri="{91240B29-F687-4f45-9708-019B960494DF}">
-                  <a14:hiddenLine xmlns:a14="http://schemas.microsoft.com/office/drawing/2010/main" xmlns="" w="9525">
+                  <a14:hiddenLine xmlns="" xmlns:a14="http://schemas.microsoft.com/office/drawing/2010/main" w="9525">
                     <a:solidFill>
                       <a:srgbClr val="000000"/>
                     </a:solidFill>
@@ -9251,7 +9251,7 @@
               </a:ln>
               <a:extLst>
                 <a:ext uri="{91240B29-F687-4f45-9708-019B960494DF}">
-                  <a14:hiddenLine xmlns:a14="http://schemas.microsoft.com/office/drawing/2010/main" xmlns="" w="9525">
+                  <a14:hiddenLine xmlns="" xmlns:a14="http://schemas.microsoft.com/office/drawing/2010/main" w="9525">
                     <a:solidFill>
                       <a:srgbClr val="000000"/>
                     </a:solidFill>
@@ -9341,7 +9341,7 @@
               </a:ln>
               <a:extLst>
                 <a:ext uri="{91240B29-F687-4f45-9708-019B960494DF}">
-                  <a14:hiddenLine xmlns:a14="http://schemas.microsoft.com/office/drawing/2010/main" xmlns="" w="9525">
+                  <a14:hiddenLine xmlns="" xmlns:a14="http://schemas.microsoft.com/office/drawing/2010/main" w="9525">
                     <a:solidFill>
                       <a:srgbClr val="000000"/>
                     </a:solidFill>
@@ -9403,7 +9403,7 @@
               </a:ln>
               <a:extLst>
                 <a:ext uri="{91240B29-F687-4f45-9708-019B960494DF}">
-                  <a14:hiddenLine xmlns:a14="http://schemas.microsoft.com/office/drawing/2010/main" xmlns="" w="9525">
+                  <a14:hiddenLine xmlns="" xmlns:a14="http://schemas.microsoft.com/office/drawing/2010/main" w="9525">
                     <a:solidFill>
                       <a:srgbClr val="000000"/>
                     </a:solidFill>
@@ -9493,7 +9493,7 @@
               </a:ln>
               <a:extLst>
                 <a:ext uri="{91240B29-F687-4f45-9708-019B960494DF}">
-                  <a14:hiddenLine xmlns:a14="http://schemas.microsoft.com/office/drawing/2010/main" xmlns="" w="9525">
+                  <a14:hiddenLine xmlns="" xmlns:a14="http://schemas.microsoft.com/office/drawing/2010/main" w="9525">
                     <a:solidFill>
                       <a:srgbClr val="000000"/>
                     </a:solidFill>
@@ -9555,7 +9555,7 @@
               </a:ln>
               <a:extLst>
                 <a:ext uri="{91240B29-F687-4f45-9708-019B960494DF}">
-                  <a14:hiddenLine xmlns:a14="http://schemas.microsoft.com/office/drawing/2010/main" xmlns="" w="9525">
+                  <a14:hiddenLine xmlns="" xmlns:a14="http://schemas.microsoft.com/office/drawing/2010/main" w="9525">
                     <a:solidFill>
                       <a:srgbClr val="000000"/>
                     </a:solidFill>
@@ -9617,7 +9617,7 @@
               </a:ln>
               <a:extLst>
                 <a:ext uri="{91240B29-F687-4f45-9708-019B960494DF}">
-                  <a14:hiddenLine xmlns:a14="http://schemas.microsoft.com/office/drawing/2010/main" xmlns="" w="9525">
+                  <a14:hiddenLine xmlns="" xmlns:a14="http://schemas.microsoft.com/office/drawing/2010/main" w="9525">
                     <a:solidFill>
                       <a:srgbClr val="000000"/>
                     </a:solidFill>
@@ -9707,7 +9707,7 @@
               </a:ln>
               <a:extLst>
                 <a:ext uri="{91240B29-F687-4f45-9708-019B960494DF}">
-                  <a14:hiddenLine xmlns:a14="http://schemas.microsoft.com/office/drawing/2010/main" xmlns="" w="9525">
+                  <a14:hiddenLine xmlns="" xmlns:a14="http://schemas.microsoft.com/office/drawing/2010/main" w="9525">
                     <a:solidFill>
                       <a:srgbClr val="000000"/>
                     </a:solidFill>
@@ -9797,7 +9797,7 @@
               </a:ln>
               <a:extLst>
                 <a:ext uri="{91240B29-F687-4f45-9708-019B960494DF}">
-                  <a14:hiddenLine xmlns:a14="http://schemas.microsoft.com/office/drawing/2010/main" xmlns="" w="9525">
+                  <a14:hiddenLine xmlns="" xmlns:a14="http://schemas.microsoft.com/office/drawing/2010/main" w="9525">
                     <a:solidFill>
                       <a:srgbClr val="000000"/>
                     </a:solidFill>
@@ -9859,7 +9859,7 @@
               </a:ln>
               <a:extLst>
                 <a:ext uri="{91240B29-F687-4f45-9708-019B960494DF}">
-                  <a14:hiddenLine xmlns:a14="http://schemas.microsoft.com/office/drawing/2010/main" xmlns="" w="9525">
+                  <a14:hiddenLine xmlns="" xmlns:a14="http://schemas.microsoft.com/office/drawing/2010/main" w="9525">
                     <a:solidFill>
                       <a:srgbClr val="000000"/>
                     </a:solidFill>
@@ -9969,7 +9969,7 @@
               </a:ln>
               <a:extLst>
                 <a:ext uri="{91240B29-F687-4f45-9708-019B960494DF}">
-                  <a14:hiddenLine xmlns:a14="http://schemas.microsoft.com/office/drawing/2010/main" xmlns="" w="9525">
+                  <a14:hiddenLine xmlns="" xmlns:a14="http://schemas.microsoft.com/office/drawing/2010/main" w="9525">
                     <a:solidFill>
                       <a:srgbClr val="000000"/>
                     </a:solidFill>
@@ -10053,7 +10053,7 @@
               </a:ln>
               <a:extLst>
                 <a:ext uri="{91240B29-F687-4f45-9708-019B960494DF}">
-                  <a14:hiddenLine xmlns:a14="http://schemas.microsoft.com/office/drawing/2010/main" xmlns="" w="9525">
+                  <a14:hiddenLine xmlns="" xmlns:a14="http://schemas.microsoft.com/office/drawing/2010/main" w="9525">
                     <a:solidFill>
                       <a:srgbClr val="000000"/>
                     </a:solidFill>
@@ -10115,7 +10115,7 @@
               </a:ln>
               <a:extLst>
                 <a:ext uri="{91240B29-F687-4f45-9708-019B960494DF}">
-                  <a14:hiddenLine xmlns:a14="http://schemas.microsoft.com/office/drawing/2010/main" xmlns="" w="9525">
+                  <a14:hiddenLine xmlns="" xmlns:a14="http://schemas.microsoft.com/office/drawing/2010/main" w="9525">
                     <a:solidFill>
                       <a:srgbClr val="000000"/>
                     </a:solidFill>
@@ -10177,7 +10177,7 @@
               </a:ln>
               <a:extLst>
                 <a:ext uri="{91240B29-F687-4f45-9708-019B960494DF}">
-                  <a14:hiddenLine xmlns:a14="http://schemas.microsoft.com/office/drawing/2010/main" xmlns="" w="9525">
+                  <a14:hiddenLine xmlns="" xmlns:a14="http://schemas.microsoft.com/office/drawing/2010/main" w="9525">
                     <a:solidFill>
                       <a:srgbClr val="000000"/>
                     </a:solidFill>
@@ -10267,7 +10267,7 @@
               </a:ln>
               <a:extLst>
                 <a:ext uri="{91240B29-F687-4f45-9708-019B960494DF}">
-                  <a14:hiddenLine xmlns:a14="http://schemas.microsoft.com/office/drawing/2010/main" xmlns="" w="9525">
+                  <a14:hiddenLine xmlns="" xmlns:a14="http://schemas.microsoft.com/office/drawing/2010/main" w="9525">
                     <a:solidFill>
                       <a:srgbClr val="000000"/>
                     </a:solidFill>
@@ -10301,7 +10301,7 @@
               </a:ln>
               <a:extLst>
                 <a:ext uri="{91240B29-F687-4f45-9708-019B960494DF}">
-                  <a14:hiddenLine xmlns:a14="http://schemas.microsoft.com/office/drawing/2010/main" xmlns="" w="9525">
+                  <a14:hiddenLine xmlns="" xmlns:a14="http://schemas.microsoft.com/office/drawing/2010/main" w="9525">
                     <a:solidFill>
                       <a:srgbClr val="000000"/>
                     </a:solidFill>
@@ -10366,7 +10366,7 @@
               </a:ln>
               <a:extLst>
                 <a:ext uri="{91240B29-F687-4f45-9708-019B960494DF}">
-                  <a14:hiddenLine xmlns:a14="http://schemas.microsoft.com/office/drawing/2010/main" xmlns="" w="9525">
+                  <a14:hiddenLine xmlns="" xmlns:a14="http://schemas.microsoft.com/office/drawing/2010/main" w="9525">
                     <a:solidFill>
                       <a:srgbClr val="000000"/>
                     </a:solidFill>
@@ -10456,7 +10456,7 @@
               </a:ln>
               <a:extLst>
                 <a:ext uri="{91240B29-F687-4f45-9708-019B960494DF}">
-                  <a14:hiddenLine xmlns:a14="http://schemas.microsoft.com/office/drawing/2010/main" xmlns="" w="9525">
+                  <a14:hiddenLine xmlns="" xmlns:a14="http://schemas.microsoft.com/office/drawing/2010/main" w="9525">
                     <a:solidFill>
                       <a:srgbClr val="000000"/>
                     </a:solidFill>
@@ -10518,7 +10518,7 @@
               </a:ln>
               <a:extLst>
                 <a:ext uri="{91240B29-F687-4f45-9708-019B960494DF}">
-                  <a14:hiddenLine xmlns:a14="http://schemas.microsoft.com/office/drawing/2010/main" xmlns="" w="9525">
+                  <a14:hiddenLine xmlns="" xmlns:a14="http://schemas.microsoft.com/office/drawing/2010/main" w="9525">
                     <a:solidFill>
                       <a:srgbClr val="000000"/>
                     </a:solidFill>
@@ -10608,7 +10608,7 @@
               </a:ln>
               <a:extLst>
                 <a:ext uri="{91240B29-F687-4f45-9708-019B960494DF}">
-                  <a14:hiddenLine xmlns:a14="http://schemas.microsoft.com/office/drawing/2010/main" xmlns="" w="9525">
+                  <a14:hiddenLine xmlns="" xmlns:a14="http://schemas.microsoft.com/office/drawing/2010/main" w="9525">
                     <a:solidFill>
                       <a:srgbClr val="000000"/>
                     </a:solidFill>
@@ -10673,7 +10673,7 @@
               </a:ln>
               <a:extLst>
                 <a:ext uri="{91240B29-F687-4f45-9708-019B960494DF}">
-                  <a14:hiddenLine xmlns:a14="http://schemas.microsoft.com/office/drawing/2010/main" xmlns="" w="9525">
+                  <a14:hiddenLine xmlns="" xmlns:a14="http://schemas.microsoft.com/office/drawing/2010/main" w="9525">
                     <a:solidFill>
                       <a:srgbClr val="000000"/>
                     </a:solidFill>
@@ -10735,7 +10735,7 @@
               </a:ln>
               <a:extLst>
                 <a:ext uri="{91240B29-F687-4f45-9708-019B960494DF}">
-                  <a14:hiddenLine xmlns:a14="http://schemas.microsoft.com/office/drawing/2010/main" xmlns="" w="9525">
+                  <a14:hiddenLine xmlns="" xmlns:a14="http://schemas.microsoft.com/office/drawing/2010/main" w="9525">
                     <a:solidFill>
                       <a:srgbClr val="000000"/>
                     </a:solidFill>
@@ -10825,7 +10825,7 @@
               </a:ln>
               <a:extLst>
                 <a:ext uri="{91240B29-F687-4f45-9708-019B960494DF}">
-                  <a14:hiddenLine xmlns:a14="http://schemas.microsoft.com/office/drawing/2010/main" xmlns="" w="9525">
+                  <a14:hiddenLine xmlns="" xmlns:a14="http://schemas.microsoft.com/office/drawing/2010/main" w="9525">
                     <a:solidFill>
                       <a:srgbClr val="000000"/>
                     </a:solidFill>
@@ -10915,7 +10915,7 @@
               </a:ln>
               <a:extLst>
                 <a:ext uri="{91240B29-F687-4f45-9708-019B960494DF}">
-                  <a14:hiddenLine xmlns:a14="http://schemas.microsoft.com/office/drawing/2010/main" xmlns="" w="9525">
+                  <a14:hiddenLine xmlns="" xmlns:a14="http://schemas.microsoft.com/office/drawing/2010/main" w="9525">
                     <a:solidFill>
                       <a:srgbClr val="000000"/>
                     </a:solidFill>
@@ -10980,7 +10980,7 @@
               </a:ln>
               <a:extLst>
                 <a:ext uri="{91240B29-F687-4f45-9708-019B960494DF}">
-                  <a14:hiddenLine xmlns:a14="http://schemas.microsoft.com/office/drawing/2010/main" xmlns="" w="9525">
+                  <a14:hiddenLine xmlns="" xmlns:a14="http://schemas.microsoft.com/office/drawing/2010/main" w="9525">
                     <a:solidFill>
                       <a:srgbClr val="000000"/>
                     </a:solidFill>
@@ -11100,7 +11100,7 @@
               </a:ln>
               <a:extLst>
                 <a:ext uri="{91240B29-F687-4f45-9708-019B960494DF}">
-                  <a14:hiddenLine xmlns:a14="http://schemas.microsoft.com/office/drawing/2010/main" xmlns="" w="9525">
+                  <a14:hiddenLine xmlns="" xmlns:a14="http://schemas.microsoft.com/office/drawing/2010/main" w="9525">
                     <a:solidFill>
                       <a:srgbClr val="000000"/>
                     </a:solidFill>
@@ -11181,7 +11181,7 @@
               </a:ln>
               <a:extLst>
                 <a:ext uri="{91240B29-F687-4f45-9708-019B960494DF}">
-                  <a14:hiddenLine xmlns:a14="http://schemas.microsoft.com/office/drawing/2010/main" xmlns="" w="9525">
+                  <a14:hiddenLine xmlns="" xmlns:a14="http://schemas.microsoft.com/office/drawing/2010/main" w="9525">
                     <a:solidFill>
                       <a:srgbClr val="000000"/>
                     </a:solidFill>
@@ -11296,7 +11296,7 @@
               </a:ln>
               <a:extLst>
                 <a:ext uri="{91240B29-F687-4f45-9708-019B960494DF}">
-                  <a14:hiddenLine xmlns:a14="http://schemas.microsoft.com/office/drawing/2010/main" xmlns="" w="9525">
+                  <a14:hiddenLine xmlns="" xmlns:a14="http://schemas.microsoft.com/office/drawing/2010/main" w="9525">
                     <a:solidFill>
                       <a:srgbClr val="000000"/>
                     </a:solidFill>
@@ -11386,7 +11386,7 @@
               </a:ln>
               <a:extLst>
                 <a:ext uri="{91240B29-F687-4f45-9708-019B960494DF}">
-                  <a14:hiddenLine xmlns:a14="http://schemas.microsoft.com/office/drawing/2010/main" xmlns="" w="9525">
+                  <a14:hiddenLine xmlns="" xmlns:a14="http://schemas.microsoft.com/office/drawing/2010/main" w="9525">
                     <a:solidFill>
                       <a:srgbClr val="000000"/>
                     </a:solidFill>
@@ -11451,7 +11451,7 @@
               </a:ln>
               <a:extLst>
                 <a:ext uri="{91240B29-F687-4f45-9708-019B960494DF}">
-                  <a14:hiddenLine xmlns:a14="http://schemas.microsoft.com/office/drawing/2010/main" xmlns="" w="9525">
+                  <a14:hiddenLine xmlns="" xmlns:a14="http://schemas.microsoft.com/office/drawing/2010/main" w="9525">
                     <a:solidFill>
                       <a:srgbClr val="000000"/>
                     </a:solidFill>
@@ -11541,7 +11541,7 @@
               </a:ln>
               <a:extLst>
                 <a:ext uri="{91240B29-F687-4f45-9708-019B960494DF}">
-                  <a14:hiddenLine xmlns:a14="http://schemas.microsoft.com/office/drawing/2010/main" xmlns="" w="9525">
+                  <a14:hiddenLine xmlns="" xmlns:a14="http://schemas.microsoft.com/office/drawing/2010/main" w="9525">
                     <a:solidFill>
                       <a:srgbClr val="000000"/>
                     </a:solidFill>
@@ -11609,7 +11609,7 @@
               </a:ln>
               <a:extLst>
                 <a:ext uri="{91240B29-F687-4f45-9708-019B960494DF}">
-                  <a14:hiddenLine xmlns:a14="http://schemas.microsoft.com/office/drawing/2010/main" xmlns="" w="9525">
+                  <a14:hiddenLine xmlns="" xmlns:a14="http://schemas.microsoft.com/office/drawing/2010/main" w="9525">
                     <a:solidFill>
                       <a:srgbClr val="000000"/>
                     </a:solidFill>
@@ -11699,7 +11699,7 @@
               </a:ln>
               <a:extLst>
                 <a:ext uri="{91240B29-F687-4f45-9708-019B960494DF}">
-                  <a14:hiddenLine xmlns:a14="http://schemas.microsoft.com/office/drawing/2010/main" xmlns="" w="9525">
+                  <a14:hiddenLine xmlns="" xmlns:a14="http://schemas.microsoft.com/office/drawing/2010/main" w="9525">
                     <a:solidFill>
                       <a:srgbClr val="000000"/>
                     </a:solidFill>
@@ -11767,7 +11767,7 @@
               </a:ln>
               <a:extLst>
                 <a:ext uri="{91240B29-F687-4f45-9708-019B960494DF}">
-                  <a14:hiddenLine xmlns:a14="http://schemas.microsoft.com/office/drawing/2010/main" xmlns="" w="9525">
+                  <a14:hiddenLine xmlns="" xmlns:a14="http://schemas.microsoft.com/office/drawing/2010/main" w="9525">
                     <a:solidFill>
                       <a:srgbClr val="000000"/>
                     </a:solidFill>
@@ -11857,7 +11857,7 @@
               </a:ln>
               <a:extLst>
                 <a:ext uri="{91240B29-F687-4f45-9708-019B960494DF}">
-                  <a14:hiddenLine xmlns:a14="http://schemas.microsoft.com/office/drawing/2010/main" xmlns="" w="9525">
+                  <a14:hiddenLine xmlns="" xmlns:a14="http://schemas.microsoft.com/office/drawing/2010/main" w="9525">
                     <a:solidFill>
                       <a:srgbClr val="000000"/>
                     </a:solidFill>
@@ -11891,7 +11891,7 @@
               </a:ln>
               <a:extLst>
                 <a:ext uri="{91240B29-F687-4f45-9708-019B960494DF}">
-                  <a14:hiddenLine xmlns:a14="http://schemas.microsoft.com/office/drawing/2010/main" xmlns="" w="9525">
+                  <a14:hiddenLine xmlns="" xmlns:a14="http://schemas.microsoft.com/office/drawing/2010/main" w="9525">
                     <a:solidFill>
                       <a:srgbClr val="000000"/>
                     </a:solidFill>
@@ -11961,35 +11961,35 @@
           <a:p>
             <a:pPr lvl="0"/>
             <a:r>
-              <a:rPr lang="en-US" smtClean="0"/>
+              <a:rPr lang="en-US"/>
               <a:t>Click to edit Master text styles</a:t>
             </a:r>
           </a:p>
           <a:p>
             <a:pPr lvl="1"/>
             <a:r>
-              <a:rPr lang="en-US" smtClean="0"/>
+              <a:rPr lang="en-US"/>
               <a:t>Second level</a:t>
             </a:r>
           </a:p>
           <a:p>
             <a:pPr lvl="2"/>
             <a:r>
-              <a:rPr lang="en-US" smtClean="0"/>
+              <a:rPr lang="en-US"/>
               <a:t>Third level</a:t>
             </a:r>
           </a:p>
           <a:p>
             <a:pPr lvl="3"/>
             <a:r>
-              <a:rPr lang="en-US" smtClean="0"/>
+              <a:rPr lang="en-US"/>
               <a:t>Fourth level</a:t>
             </a:r>
           </a:p>
           <a:p>
             <a:pPr lvl="4"/>
             <a:r>
-              <a:rPr lang="en-US" smtClean="0"/>
+              <a:rPr lang="en-US"/>
               <a:t>Fifth level</a:t>
             </a:r>
             <a:endParaRPr lang="en-US" dirty="0"/>
@@ -12031,7 +12031,7 @@
           <a:p>
             <a:fld id="{C5DA069D-2E5B-4FFF-BEBF-3DA0AC684B9D}" type="datetimeFigureOut">
               <a:rPr lang="en-US" smtClean="0"/>
-              <a:t>12/11/2016</a:t>
+              <a:t>12/12/2016</a:t>
             </a:fld>
             <a:endParaRPr lang="en-US"/>
           </a:p>
@@ -12472,10 +12472,9 @@
           <a:lstStyle/>
           <a:p>
             <a:r>
-              <a:rPr lang="en-US" dirty="0" smtClean="0"/>
+              <a:rPr lang="en-US" dirty="0"/>
               <a:t>Snake</a:t>
             </a:r>
-            <a:endParaRPr lang="en-US" dirty="0"/>
           </a:p>
         </p:txBody>
       </p:sp>
@@ -12495,7 +12494,7 @@
           <a:lstStyle/>
           <a:p>
             <a:r>
-              <a:rPr lang="en-US" dirty="0" smtClean="0"/>
+              <a:rPr lang="en-US" dirty="0"/>
               <a:t>By Julia Abbott, Alex Blair, McKenna Galle, </a:t>
             </a:r>
             <a:r>
@@ -12506,7 +12505,6 @@
               <a:rPr lang="en-US" dirty="0"/>
               <a:t> Schumann</a:t>
             </a:r>
-            <a:endParaRPr lang="en-US" dirty="0"/>
           </a:p>
         </p:txBody>
       </p:sp>
@@ -12556,10 +12554,9 @@
           <a:lstStyle/>
           <a:p>
             <a:r>
-              <a:rPr lang="en-US" dirty="0" smtClean="0"/>
+              <a:rPr lang="en-US" dirty="0"/>
               <a:t>Goals </a:t>
             </a:r>
-            <a:endParaRPr lang="en-US" dirty="0"/>
           </a:p>
         </p:txBody>
       </p:sp>
@@ -12579,37 +12576,43 @@
           <a:lstStyle/>
           <a:p>
             <a:r>
-              <a:rPr lang="en-US" dirty="0" smtClean="0"/>
+              <a:rPr lang="en-US" dirty="0"/>
               <a:t>To create an operational version of the classical game of snake, using only ASCII characters to denote important game pieces. </a:t>
             </a:r>
           </a:p>
           <a:p>
             <a:pPr lvl="2"/>
             <a:r>
-              <a:rPr lang="en-US" dirty="0" smtClean="0"/>
+              <a:rPr lang="en-US" dirty="0"/>
               <a:t>Such as</a:t>
             </a:r>
-            <a:endParaRPr lang="en-US" dirty="0"/>
           </a:p>
           <a:p>
             <a:pPr lvl="3"/>
             <a:r>
-              <a:rPr lang="en-US" dirty="0" smtClean="0"/>
+              <a:rPr lang="en-US" dirty="0"/>
               <a:t>Snake</a:t>
             </a:r>
           </a:p>
           <a:p>
             <a:pPr lvl="3"/>
             <a:r>
-              <a:rPr lang="en-US" dirty="0" smtClean="0"/>
+              <a:rPr lang="en-US" dirty="0"/>
               <a:t>Food</a:t>
             </a:r>
           </a:p>
           <a:p>
             <a:pPr lvl="3"/>
             <a:r>
-              <a:rPr lang="en-US" dirty="0" smtClean="0"/>
+              <a:rPr lang="en-US" dirty="0"/>
               <a:t>Boarders of game board </a:t>
+            </a:r>
+          </a:p>
+          <a:p>
+            <a:pPr lvl="3"/>
+            <a:r>
+              <a:rPr lang="en-US" dirty="0"/>
+              <a:t>Tail Segments of the Snake</a:t>
             </a:r>
           </a:p>
         </p:txBody>
@@ -12660,10 +12663,9 @@
           <a:lstStyle/>
           <a:p>
             <a:r>
-              <a:rPr lang="en-US" dirty="0" smtClean="0"/>
+              <a:rPr lang="en-US" dirty="0"/>
               <a:t>Design </a:t>
             </a:r>
-            <a:endParaRPr lang="en-US" dirty="0"/>
           </a:p>
         </p:txBody>
       </p:sp>
@@ -12685,82 +12687,81 @@
           <a:lstStyle/>
           <a:p>
             <a:r>
-              <a:rPr lang="en-US" dirty="0" smtClean="0"/>
+              <a:rPr lang="en-US" dirty="0"/>
               <a:t>Procedures  </a:t>
             </a:r>
           </a:p>
           <a:p>
             <a:pPr lvl="1"/>
             <a:r>
-              <a:rPr lang="en-US" dirty="0" err="1" smtClean="0"/>
+              <a:rPr lang="en-US" dirty="0" err="1"/>
               <a:t>FoodEat</a:t>
             </a:r>
-            <a:endParaRPr lang="en-US" dirty="0" smtClean="0"/>
+            <a:endParaRPr lang="en-US" dirty="0"/>
           </a:p>
           <a:p>
             <a:pPr lvl="2"/>
             <a:r>
-              <a:rPr lang="en-US" dirty="0" smtClean="0"/>
+              <a:rPr lang="en-US" dirty="0"/>
               <a:t>Randomly generates food for the snake to eat and to grow. This is denoted by the character ‘a’.</a:t>
             </a:r>
           </a:p>
           <a:p>
             <a:pPr lvl="1"/>
             <a:r>
-              <a:rPr lang="en-US" dirty="0" smtClean="0"/>
+              <a:rPr lang="en-US" dirty="0"/>
               <a:t>Snake</a:t>
             </a:r>
           </a:p>
           <a:p>
             <a:pPr lvl="2"/>
             <a:r>
-              <a:rPr lang="en-US" dirty="0" smtClean="0"/>
+              <a:rPr lang="en-US" dirty="0"/>
               <a:t>Creates a stack for the snake. The game starts with one character, and grows each time a piece of food is eaten. The snake is denoted by the character ‘#’.</a:t>
             </a:r>
           </a:p>
           <a:p>
             <a:pPr lvl="1"/>
             <a:r>
-              <a:rPr lang="en-US" dirty="0" err="1" smtClean="0"/>
+              <a:rPr lang="en-US" dirty="0" err="1"/>
               <a:t>SnakeMovement</a:t>
             </a:r>
-            <a:endParaRPr lang="en-US" dirty="0" smtClean="0"/>
+            <a:endParaRPr lang="en-US" dirty="0"/>
           </a:p>
           <a:p>
             <a:pPr lvl="2"/>
             <a:r>
-              <a:rPr lang="en-US" dirty="0" smtClean="0"/>
+              <a:rPr lang="en-US" dirty="0"/>
               <a:t>Takes user input (the up, down, left, and right arrow keys) and translates it into which direction the snake should travel at any given point in the game. </a:t>
             </a:r>
-            <a:endParaRPr lang="en-US" dirty="0"/>
           </a:p>
           <a:p>
             <a:pPr lvl="2"/>
             <a:r>
-              <a:rPr lang="en-US" dirty="0" smtClean="0"/>
+              <a:rPr lang="en-US" dirty="0"/>
               <a:t>Uses </a:t>
             </a:r>
             <a:r>
-              <a:rPr lang="en-US" dirty="0" err="1" smtClean="0"/>
+              <a:rPr lang="en-US" dirty="0" err="1"/>
               <a:t>Gotoxy</a:t>
             </a:r>
             <a:r>
-              <a:rPr lang="en-US" dirty="0" smtClean="0"/>
+              <a:rPr lang="en-US" dirty="0"/>
               <a:t> to translate the user input into x-y coordinates.</a:t>
             </a:r>
           </a:p>
           <a:p>
             <a:pPr lvl="1"/>
             <a:r>
-              <a:rPr lang="en-US" dirty="0" err="1" smtClean="0"/>
+              <a:rPr lang="en-US" dirty="0" err="1"/>
               <a:t>GameOver</a:t>
             </a:r>
-            <a:endParaRPr lang="en-US" dirty="0" smtClean="0"/>
+            <a:endParaRPr lang="en-US" dirty="0"/>
           </a:p>
           <a:p>
             <a:pPr lvl="2"/>
             <a:r>
-              <a:rPr lang="en-US" dirty="0" smtClean="0"/>
+              <a:rPr lang="en-US" dirty="0"/>
               <a:t>Prints the message “Game over” to the screen when one of several conditions are met to trigger the game’s end.</a:t>
             </a:r>
           </a:p>
@@ -12812,10 +12813,9 @@
           <a:lstStyle/>
           <a:p>
             <a:r>
-              <a:rPr lang="en-US" dirty="0" smtClean="0"/>
+              <a:rPr lang="en-US" dirty="0"/>
               <a:t>Design Continued</a:t>
             </a:r>
-            <a:endParaRPr lang="en-US" dirty="0"/>
           </a:p>
         </p:txBody>
       </p:sp>
@@ -12835,14 +12835,14 @@
           <a:lstStyle/>
           <a:p>
             <a:r>
-              <a:rPr lang="en-US" dirty="0" smtClean="0"/>
+              <a:rPr lang="en-US" dirty="0"/>
               <a:t>Procedures continued</a:t>
             </a:r>
           </a:p>
           <a:p>
             <a:pPr lvl="1"/>
             <a:r>
-              <a:rPr lang="en-US" dirty="0" err="1" smtClean="0"/>
+              <a:rPr lang="en-US" dirty="0" err="1"/>
               <a:t>SetGame</a:t>
             </a:r>
             <a:endParaRPr lang="en-US" dirty="0"/>
@@ -12934,10 +12934,9 @@
           <a:lstStyle/>
           <a:p>
             <a:r>
-              <a:rPr lang="en-US" dirty="0" smtClean="0"/>
+              <a:rPr lang="en-US" dirty="0"/>
               <a:t>Lessons Learned </a:t>
             </a:r>
-            <a:endParaRPr lang="en-US" dirty="0"/>
           </a:p>
         </p:txBody>
       </p:sp>
@@ -12957,28 +12956,27 @@
           <a:lstStyle/>
           <a:p>
             <a:r>
-              <a:rPr lang="en-US" dirty="0" smtClean="0"/>
+              <a:rPr lang="en-US" dirty="0"/>
               <a:t>How to better use Irvine32 library</a:t>
             </a:r>
           </a:p>
           <a:p>
             <a:r>
-              <a:rPr lang="en-US" dirty="0" smtClean="0"/>
+              <a:rPr lang="en-US" dirty="0"/>
               <a:t>How to use jumps and conditionals</a:t>
             </a:r>
           </a:p>
           <a:p>
             <a:r>
-              <a:rPr lang="en-US" dirty="0" smtClean="0"/>
+              <a:rPr lang="en-US" dirty="0"/>
               <a:t>How to implement procedures and loops with jumps</a:t>
             </a:r>
           </a:p>
           <a:p>
             <a:r>
-              <a:rPr lang="en-US" dirty="0" smtClean="0"/>
+              <a:rPr lang="en-US" dirty="0"/>
               <a:t>How to interpret and fix errors</a:t>
             </a:r>
-            <a:endParaRPr lang="en-US" dirty="0" smtClean="0"/>
           </a:p>
           <a:p>
             <a:endParaRPr lang="en-US" dirty="0"/>

</xml_diff>

<commit_message>
Added a slide to the Power point
</commit_message>
<xml_diff>
--- a/Final Project Presentation.pptx
+++ b/Final Project Presentation.pptx
@@ -10,6 +10,7 @@
     <p:sldId id="258" r:id="rId4"/>
     <p:sldId id="259" r:id="rId5"/>
     <p:sldId id="260" r:id="rId6"/>
+    <p:sldId id="261" r:id="rId7"/>
   </p:sldIdLst>
   <p:sldSz cx="12192000" cy="6858000"/>
   <p:notesSz cx="6858000" cy="9144000"/>
@@ -173,7 +174,7 @@
           <a:noFill/>
           <a:extLst>
             <a:ext uri="{909E8E84-426E-40dd-AFC4-6F175D3DCCD1}">
-              <a14:hiddenFill xmlns="" xmlns:a14="http://schemas.microsoft.com/office/drawing/2010/main">
+              <a14:hiddenFill xmlns:a14="http://schemas.microsoft.com/office/drawing/2010/main" xmlns="">
                 <a:solidFill>
                   <a:srgbClr val="FFFFFF"/>
                 </a:solidFill>
@@ -232,7 +233,7 @@
             </a:ln>
             <a:extLst>
               <a:ext uri="{91240B29-F687-4f45-9708-019B960494DF}">
-                <a14:hiddenLine xmlns="" xmlns:a14="http://schemas.microsoft.com/office/drawing/2010/main" w="9525">
+                <a14:hiddenLine xmlns:a14="http://schemas.microsoft.com/office/drawing/2010/main" xmlns="" w="9525">
                   <a:solidFill>
                     <a:srgbClr val="000000"/>
                   </a:solidFill>
@@ -322,7 +323,7 @@
             </a:ln>
             <a:extLst>
               <a:ext uri="{91240B29-F687-4f45-9708-019B960494DF}">
-                <a14:hiddenLine xmlns="" xmlns:a14="http://schemas.microsoft.com/office/drawing/2010/main" w="9525">
+                <a14:hiddenLine xmlns:a14="http://schemas.microsoft.com/office/drawing/2010/main" xmlns="" w="9525">
                   <a:solidFill>
                     <a:srgbClr val="000000"/>
                   </a:solidFill>
@@ -412,7 +413,7 @@
             </a:ln>
             <a:extLst>
               <a:ext uri="{91240B29-F687-4f45-9708-019B960494DF}">
-                <a14:hiddenLine xmlns="" xmlns:a14="http://schemas.microsoft.com/office/drawing/2010/main" w="9525">
+                <a14:hiddenLine xmlns:a14="http://schemas.microsoft.com/office/drawing/2010/main" xmlns="" w="9525">
                   <a:solidFill>
                     <a:srgbClr val="000000"/>
                   </a:solidFill>
@@ -446,7 +447,7 @@
             </a:ln>
             <a:extLst>
               <a:ext uri="{91240B29-F687-4f45-9708-019B960494DF}">
-                <a14:hiddenLine xmlns="" xmlns:a14="http://schemas.microsoft.com/office/drawing/2010/main" w="9525">
+                <a14:hiddenLine xmlns:a14="http://schemas.microsoft.com/office/drawing/2010/main" xmlns="" w="9525">
                   <a:solidFill>
                     <a:srgbClr val="000000"/>
                   </a:solidFill>
@@ -536,7 +537,7 @@
             </a:ln>
             <a:extLst>
               <a:ext uri="{91240B29-F687-4f45-9708-019B960494DF}">
-                <a14:hiddenLine xmlns="" xmlns:a14="http://schemas.microsoft.com/office/drawing/2010/main" w="9525">
+                <a14:hiddenLine xmlns:a14="http://schemas.microsoft.com/office/drawing/2010/main" xmlns="" w="9525">
                   <a:solidFill>
                     <a:srgbClr val="000000"/>
                   </a:solidFill>
@@ -598,7 +599,7 @@
             </a:ln>
             <a:extLst>
               <a:ext uri="{91240B29-F687-4f45-9708-019B960494DF}">
-                <a14:hiddenLine xmlns="" xmlns:a14="http://schemas.microsoft.com/office/drawing/2010/main" w="9525">
+                <a14:hiddenLine xmlns:a14="http://schemas.microsoft.com/office/drawing/2010/main" xmlns="" w="9525">
                   <a:solidFill>
                     <a:srgbClr val="000000"/>
                   </a:solidFill>
@@ -660,7 +661,7 @@
             </a:ln>
             <a:extLst>
               <a:ext uri="{91240B29-F687-4f45-9708-019B960494DF}">
-                <a14:hiddenLine xmlns="" xmlns:a14="http://schemas.microsoft.com/office/drawing/2010/main" w="9525">
+                <a14:hiddenLine xmlns:a14="http://schemas.microsoft.com/office/drawing/2010/main" xmlns="" w="9525">
                   <a:solidFill>
                     <a:srgbClr val="000000"/>
                   </a:solidFill>
@@ -750,7 +751,7 @@
             </a:ln>
             <a:extLst>
               <a:ext uri="{91240B29-F687-4f45-9708-019B960494DF}">
-                <a14:hiddenLine xmlns="" xmlns:a14="http://schemas.microsoft.com/office/drawing/2010/main" w="9525">
+                <a14:hiddenLine xmlns:a14="http://schemas.microsoft.com/office/drawing/2010/main" xmlns="" w="9525">
                   <a:solidFill>
                     <a:srgbClr val="000000"/>
                   </a:solidFill>
@@ -812,7 +813,7 @@
             </a:ln>
             <a:extLst>
               <a:ext uri="{91240B29-F687-4f45-9708-019B960494DF}">
-                <a14:hiddenLine xmlns="" xmlns:a14="http://schemas.microsoft.com/office/drawing/2010/main" w="9525">
+                <a14:hiddenLine xmlns:a14="http://schemas.microsoft.com/office/drawing/2010/main" xmlns="" w="9525">
                   <a:solidFill>
                     <a:srgbClr val="000000"/>
                   </a:solidFill>
@@ -874,7 +875,7 @@
             </a:ln>
             <a:extLst>
               <a:ext uri="{91240B29-F687-4f45-9708-019B960494DF}">
-                <a14:hiddenLine xmlns="" xmlns:a14="http://schemas.microsoft.com/office/drawing/2010/main" w="9525">
+                <a14:hiddenLine xmlns:a14="http://schemas.microsoft.com/office/drawing/2010/main" xmlns="" w="9525">
                   <a:solidFill>
                     <a:srgbClr val="000000"/>
                   </a:solidFill>
@@ -964,7 +965,7 @@
             </a:ln>
             <a:extLst>
               <a:ext uri="{91240B29-F687-4f45-9708-019B960494DF}">
-                <a14:hiddenLine xmlns="" xmlns:a14="http://schemas.microsoft.com/office/drawing/2010/main" w="9525">
+                <a14:hiddenLine xmlns:a14="http://schemas.microsoft.com/office/drawing/2010/main" xmlns="" w="9525">
                   <a:solidFill>
                     <a:srgbClr val="000000"/>
                   </a:solidFill>
@@ -1054,7 +1055,7 @@
             </a:ln>
             <a:extLst>
               <a:ext uri="{91240B29-F687-4f45-9708-019B960494DF}">
-                <a14:hiddenLine xmlns="" xmlns:a14="http://schemas.microsoft.com/office/drawing/2010/main" w="9525">
+                <a14:hiddenLine xmlns:a14="http://schemas.microsoft.com/office/drawing/2010/main" xmlns="" w="9525">
                   <a:solidFill>
                     <a:srgbClr val="000000"/>
                   </a:solidFill>
@@ -1116,7 +1117,7 @@
             </a:ln>
             <a:extLst>
               <a:ext uri="{91240B29-F687-4f45-9708-019B960494DF}">
-                <a14:hiddenLine xmlns="" xmlns:a14="http://schemas.microsoft.com/office/drawing/2010/main" w="9525">
+                <a14:hiddenLine xmlns:a14="http://schemas.microsoft.com/office/drawing/2010/main" xmlns="" w="9525">
                   <a:solidFill>
                     <a:srgbClr val="000000"/>
                   </a:solidFill>
@@ -1226,7 +1227,7 @@
             </a:ln>
             <a:extLst>
               <a:ext uri="{91240B29-F687-4f45-9708-019B960494DF}">
-                <a14:hiddenLine xmlns="" xmlns:a14="http://schemas.microsoft.com/office/drawing/2010/main" w="9525">
+                <a14:hiddenLine xmlns:a14="http://schemas.microsoft.com/office/drawing/2010/main" xmlns="" w="9525">
                   <a:solidFill>
                     <a:srgbClr val="000000"/>
                   </a:solidFill>
@@ -1288,7 +1289,7 @@
             </a:ln>
             <a:extLst>
               <a:ext uri="{91240B29-F687-4f45-9708-019B960494DF}">
-                <a14:hiddenLine xmlns="" xmlns:a14="http://schemas.microsoft.com/office/drawing/2010/main" w="9525">
+                <a14:hiddenLine xmlns:a14="http://schemas.microsoft.com/office/drawing/2010/main" xmlns="" w="9525">
                   <a:solidFill>
                     <a:srgbClr val="000000"/>
                   </a:solidFill>
@@ -1378,7 +1379,7 @@
             </a:ln>
             <a:extLst>
               <a:ext uri="{91240B29-F687-4f45-9708-019B960494DF}">
-                <a14:hiddenLine xmlns="" xmlns:a14="http://schemas.microsoft.com/office/drawing/2010/main" w="9525">
+                <a14:hiddenLine xmlns:a14="http://schemas.microsoft.com/office/drawing/2010/main" xmlns="" w="9525">
                   <a:solidFill>
                     <a:srgbClr val="000000"/>
                   </a:solidFill>
@@ -1468,7 +1469,7 @@
             </a:ln>
             <a:extLst>
               <a:ext uri="{91240B29-F687-4f45-9708-019B960494DF}">
-                <a14:hiddenLine xmlns="" xmlns:a14="http://schemas.microsoft.com/office/drawing/2010/main" w="9525">
+                <a14:hiddenLine xmlns:a14="http://schemas.microsoft.com/office/drawing/2010/main" xmlns="" w="9525">
                   <a:solidFill>
                     <a:srgbClr val="000000"/>
                   </a:solidFill>
@@ -1530,7 +1531,7 @@
             </a:ln>
             <a:extLst>
               <a:ext uri="{91240B29-F687-4f45-9708-019B960494DF}">
-                <a14:hiddenLine xmlns="" xmlns:a14="http://schemas.microsoft.com/office/drawing/2010/main" w="9525">
+                <a14:hiddenLine xmlns:a14="http://schemas.microsoft.com/office/drawing/2010/main" xmlns="" w="9525">
                   <a:solidFill>
                     <a:srgbClr val="000000"/>
                   </a:solidFill>
@@ -1620,7 +1621,7 @@
             </a:ln>
             <a:extLst>
               <a:ext uri="{91240B29-F687-4f45-9708-019B960494DF}">
-                <a14:hiddenLine xmlns="" xmlns:a14="http://schemas.microsoft.com/office/drawing/2010/main" w="9525">
+                <a14:hiddenLine xmlns:a14="http://schemas.microsoft.com/office/drawing/2010/main" xmlns="" w="9525">
                   <a:solidFill>
                     <a:srgbClr val="000000"/>
                   </a:solidFill>
@@ -1710,7 +1711,7 @@
             </a:ln>
             <a:extLst>
               <a:ext uri="{91240B29-F687-4f45-9708-019B960494DF}">
-                <a14:hiddenLine xmlns="" xmlns:a14="http://schemas.microsoft.com/office/drawing/2010/main" w="9525">
+                <a14:hiddenLine xmlns:a14="http://schemas.microsoft.com/office/drawing/2010/main" xmlns="" w="9525">
                   <a:solidFill>
                     <a:srgbClr val="000000"/>
                   </a:solidFill>
@@ -1766,7 +1767,7 @@
             </a:ln>
             <a:extLst>
               <a:ext uri="{91240B29-F687-4f45-9708-019B960494DF}">
-                <a14:hiddenLine xmlns="" xmlns:a14="http://schemas.microsoft.com/office/drawing/2010/main" w="9525">
+                <a14:hiddenLine xmlns:a14="http://schemas.microsoft.com/office/drawing/2010/main" xmlns="" w="9525">
                   <a:solidFill>
                     <a:srgbClr val="000000"/>
                   </a:solidFill>
@@ -1856,7 +1857,7 @@
             </a:ln>
             <a:extLst>
               <a:ext uri="{91240B29-F687-4f45-9708-019B960494DF}">
-                <a14:hiddenLine xmlns="" xmlns:a14="http://schemas.microsoft.com/office/drawing/2010/main" w="9525">
+                <a14:hiddenLine xmlns:a14="http://schemas.microsoft.com/office/drawing/2010/main" xmlns="" w="9525">
                   <a:solidFill>
                     <a:srgbClr val="000000"/>
                   </a:solidFill>
@@ -1912,7 +1913,7 @@
             </a:ln>
             <a:extLst>
               <a:ext uri="{91240B29-F687-4f45-9708-019B960494DF}">
-                <a14:hiddenLine xmlns="" xmlns:a14="http://schemas.microsoft.com/office/drawing/2010/main" w="9525">
+                <a14:hiddenLine xmlns:a14="http://schemas.microsoft.com/office/drawing/2010/main" xmlns="" w="9525">
                   <a:solidFill>
                     <a:srgbClr val="000000"/>
                   </a:solidFill>
@@ -2002,7 +2003,7 @@
             </a:ln>
             <a:extLst>
               <a:ext uri="{91240B29-F687-4f45-9708-019B960494DF}">
-                <a14:hiddenLine xmlns="" xmlns:a14="http://schemas.microsoft.com/office/drawing/2010/main" w="9525">
+                <a14:hiddenLine xmlns:a14="http://schemas.microsoft.com/office/drawing/2010/main" xmlns="" w="9525">
                   <a:solidFill>
                     <a:srgbClr val="000000"/>
                   </a:solidFill>
@@ -2070,7 +2071,7 @@
             </a:ln>
             <a:extLst>
               <a:ext uri="{91240B29-F687-4f45-9708-019B960494DF}">
-                <a14:hiddenLine xmlns="" xmlns:a14="http://schemas.microsoft.com/office/drawing/2010/main" w="9525">
+                <a14:hiddenLine xmlns:a14="http://schemas.microsoft.com/office/drawing/2010/main" xmlns="" w="9525">
                   <a:solidFill>
                     <a:srgbClr val="000000"/>
                   </a:solidFill>
@@ -2160,7 +2161,7 @@
             </a:ln>
             <a:extLst>
               <a:ext uri="{91240B29-F687-4f45-9708-019B960494DF}">
-                <a14:hiddenLine xmlns="" xmlns:a14="http://schemas.microsoft.com/office/drawing/2010/main" w="9525">
+                <a14:hiddenLine xmlns:a14="http://schemas.microsoft.com/office/drawing/2010/main" xmlns="" w="9525">
                   <a:solidFill>
                     <a:srgbClr val="000000"/>
                   </a:solidFill>
@@ -2228,7 +2229,7 @@
             </a:ln>
             <a:extLst>
               <a:ext uri="{91240B29-F687-4f45-9708-019B960494DF}">
-                <a14:hiddenLine xmlns="" xmlns:a14="http://schemas.microsoft.com/office/drawing/2010/main" w="9525">
+                <a14:hiddenLine xmlns:a14="http://schemas.microsoft.com/office/drawing/2010/main" xmlns="" w="9525">
                   <a:solidFill>
                     <a:srgbClr val="000000"/>
                   </a:solidFill>
@@ -2318,7 +2319,7 @@
             </a:ln>
             <a:extLst>
               <a:ext uri="{91240B29-F687-4f45-9708-019B960494DF}">
-                <a14:hiddenLine xmlns="" xmlns:a14="http://schemas.microsoft.com/office/drawing/2010/main" w="9525">
+                <a14:hiddenLine xmlns:a14="http://schemas.microsoft.com/office/drawing/2010/main" xmlns="" w="9525">
                   <a:solidFill>
                     <a:srgbClr val="000000"/>
                   </a:solidFill>
@@ -2352,7 +2353,7 @@
             </a:ln>
             <a:extLst>
               <a:ext uri="{91240B29-F687-4f45-9708-019B960494DF}">
-                <a14:hiddenLine xmlns="" xmlns:a14="http://schemas.microsoft.com/office/drawing/2010/main" w="9525">
+                <a14:hiddenLine xmlns:a14="http://schemas.microsoft.com/office/drawing/2010/main" xmlns="" w="9525">
                   <a:solidFill>
                     <a:srgbClr val="000000"/>
                   </a:solidFill>
@@ -2442,7 +2443,7 @@
             </a:ln>
             <a:extLst>
               <a:ext uri="{91240B29-F687-4f45-9708-019B960494DF}">
-                <a14:hiddenLine xmlns="" xmlns:a14="http://schemas.microsoft.com/office/drawing/2010/main" w="9525">
+                <a14:hiddenLine xmlns:a14="http://schemas.microsoft.com/office/drawing/2010/main" xmlns="" w="9525">
                   <a:solidFill>
                     <a:srgbClr val="000000"/>
                   </a:solidFill>
@@ -2504,7 +2505,7 @@
             </a:ln>
             <a:extLst>
               <a:ext uri="{91240B29-F687-4f45-9708-019B960494DF}">
-                <a14:hiddenLine xmlns="" xmlns:a14="http://schemas.microsoft.com/office/drawing/2010/main" w="9525">
+                <a14:hiddenLine xmlns:a14="http://schemas.microsoft.com/office/drawing/2010/main" xmlns="" w="9525">
                   <a:solidFill>
                     <a:srgbClr val="000000"/>
                   </a:solidFill>
@@ -2566,7 +2567,7 @@
             </a:ln>
             <a:extLst>
               <a:ext uri="{91240B29-F687-4f45-9708-019B960494DF}">
-                <a14:hiddenLine xmlns="" xmlns:a14="http://schemas.microsoft.com/office/drawing/2010/main" w="9525">
+                <a14:hiddenLine xmlns:a14="http://schemas.microsoft.com/office/drawing/2010/main" xmlns="" w="9525">
                   <a:solidFill>
                     <a:srgbClr val="000000"/>
                   </a:solidFill>
@@ -2656,7 +2657,7 @@
             </a:ln>
             <a:extLst>
               <a:ext uri="{91240B29-F687-4f45-9708-019B960494DF}">
-                <a14:hiddenLine xmlns="" xmlns:a14="http://schemas.microsoft.com/office/drawing/2010/main" w="9525">
+                <a14:hiddenLine xmlns:a14="http://schemas.microsoft.com/office/drawing/2010/main" xmlns="" w="9525">
                   <a:solidFill>
                     <a:srgbClr val="000000"/>
                   </a:solidFill>
@@ -2724,7 +2725,7 @@
             </a:ln>
             <a:extLst>
               <a:ext uri="{91240B29-F687-4f45-9708-019B960494DF}">
-                <a14:hiddenLine xmlns="" xmlns:a14="http://schemas.microsoft.com/office/drawing/2010/main" w="9525">
+                <a14:hiddenLine xmlns:a14="http://schemas.microsoft.com/office/drawing/2010/main" xmlns="" w="9525">
                   <a:solidFill>
                     <a:srgbClr val="000000"/>
                   </a:solidFill>
@@ -2786,7 +2787,7 @@
             </a:ln>
             <a:extLst>
               <a:ext uri="{91240B29-F687-4f45-9708-019B960494DF}">
-                <a14:hiddenLine xmlns="" xmlns:a14="http://schemas.microsoft.com/office/drawing/2010/main" w="9525">
+                <a14:hiddenLine xmlns:a14="http://schemas.microsoft.com/office/drawing/2010/main" xmlns="" w="9525">
                   <a:solidFill>
                     <a:srgbClr val="000000"/>
                   </a:solidFill>
@@ -2876,7 +2877,7 @@
             </a:ln>
             <a:extLst>
               <a:ext uri="{91240B29-F687-4f45-9708-019B960494DF}">
-                <a14:hiddenLine xmlns="" xmlns:a14="http://schemas.microsoft.com/office/drawing/2010/main" w="9525">
+                <a14:hiddenLine xmlns:a14="http://schemas.microsoft.com/office/drawing/2010/main" xmlns="" w="9525">
                   <a:solidFill>
                     <a:srgbClr val="000000"/>
                   </a:solidFill>
@@ -2938,7 +2939,7 @@
             </a:ln>
             <a:extLst>
               <a:ext uri="{91240B29-F687-4f45-9708-019B960494DF}">
-                <a14:hiddenLine xmlns="" xmlns:a14="http://schemas.microsoft.com/office/drawing/2010/main" w="9525">
+                <a14:hiddenLine xmlns:a14="http://schemas.microsoft.com/office/drawing/2010/main" xmlns="" w="9525">
                   <a:solidFill>
                     <a:srgbClr val="000000"/>
                   </a:solidFill>
@@ -3028,7 +3029,7 @@
             </a:ln>
             <a:extLst>
               <a:ext uri="{91240B29-F687-4f45-9708-019B960494DF}">
-                <a14:hiddenLine xmlns="" xmlns:a14="http://schemas.microsoft.com/office/drawing/2010/main" w="9525">
+                <a14:hiddenLine xmlns:a14="http://schemas.microsoft.com/office/drawing/2010/main" xmlns="" w="9525">
                   <a:solidFill>
                     <a:srgbClr val="000000"/>
                   </a:solidFill>
@@ -3090,7 +3091,7 @@
             </a:ln>
             <a:extLst>
               <a:ext uri="{91240B29-F687-4f45-9708-019B960494DF}">
-                <a14:hiddenLine xmlns="" xmlns:a14="http://schemas.microsoft.com/office/drawing/2010/main" w="9525">
+                <a14:hiddenLine xmlns:a14="http://schemas.microsoft.com/office/drawing/2010/main" xmlns="" w="9525">
                   <a:solidFill>
                     <a:srgbClr val="000000"/>
                   </a:solidFill>
@@ -3180,7 +3181,7 @@
             </a:ln>
             <a:extLst>
               <a:ext uri="{91240B29-F687-4f45-9708-019B960494DF}">
-                <a14:hiddenLine xmlns="" xmlns:a14="http://schemas.microsoft.com/office/drawing/2010/main" w="9525">
+                <a14:hiddenLine xmlns:a14="http://schemas.microsoft.com/office/drawing/2010/main" xmlns="" w="9525">
                   <a:solidFill>
                     <a:srgbClr val="000000"/>
                   </a:solidFill>
@@ -3214,7 +3215,7 @@
             </a:ln>
             <a:extLst>
               <a:ext uri="{91240B29-F687-4f45-9708-019B960494DF}">
-                <a14:hiddenLine xmlns="" xmlns:a14="http://schemas.microsoft.com/office/drawing/2010/main" w="9525">
+                <a14:hiddenLine xmlns:a14="http://schemas.microsoft.com/office/drawing/2010/main" xmlns="" w="9525">
                   <a:solidFill>
                     <a:srgbClr val="000000"/>
                   </a:solidFill>
@@ -3279,7 +3280,7 @@
             </a:ln>
             <a:extLst>
               <a:ext uri="{91240B29-F687-4f45-9708-019B960494DF}">
-                <a14:hiddenLine xmlns="" xmlns:a14="http://schemas.microsoft.com/office/drawing/2010/main" w="9525">
+                <a14:hiddenLine xmlns:a14="http://schemas.microsoft.com/office/drawing/2010/main" xmlns="" w="9525">
                   <a:solidFill>
                     <a:srgbClr val="000000"/>
                   </a:solidFill>
@@ -3369,7 +3370,7 @@
             </a:ln>
             <a:extLst>
               <a:ext uri="{91240B29-F687-4f45-9708-019B960494DF}">
-                <a14:hiddenLine xmlns="" xmlns:a14="http://schemas.microsoft.com/office/drawing/2010/main" w="9525">
+                <a14:hiddenLine xmlns:a14="http://schemas.microsoft.com/office/drawing/2010/main" xmlns="" w="9525">
                   <a:solidFill>
                     <a:srgbClr val="000000"/>
                   </a:solidFill>
@@ -3431,7 +3432,7 @@
             </a:ln>
             <a:extLst>
               <a:ext uri="{91240B29-F687-4f45-9708-019B960494DF}">
-                <a14:hiddenLine xmlns="" xmlns:a14="http://schemas.microsoft.com/office/drawing/2010/main" w="9525">
+                <a14:hiddenLine xmlns:a14="http://schemas.microsoft.com/office/drawing/2010/main" xmlns="" w="9525">
                   <a:solidFill>
                     <a:srgbClr val="000000"/>
                   </a:solidFill>
@@ -3521,7 +3522,7 @@
             </a:ln>
             <a:extLst>
               <a:ext uri="{91240B29-F687-4f45-9708-019B960494DF}">
-                <a14:hiddenLine xmlns="" xmlns:a14="http://schemas.microsoft.com/office/drawing/2010/main" w="9525">
+                <a14:hiddenLine xmlns:a14="http://schemas.microsoft.com/office/drawing/2010/main" xmlns="" w="9525">
                   <a:solidFill>
                     <a:srgbClr val="000000"/>
                   </a:solidFill>
@@ -3611,7 +3612,7 @@
             </a:ln>
             <a:extLst>
               <a:ext uri="{91240B29-F687-4f45-9708-019B960494DF}">
-                <a14:hiddenLine xmlns="" xmlns:a14="http://schemas.microsoft.com/office/drawing/2010/main" w="9525">
+                <a14:hiddenLine xmlns:a14="http://schemas.microsoft.com/office/drawing/2010/main" xmlns="" w="9525">
                   <a:solidFill>
                     <a:srgbClr val="000000"/>
                   </a:solidFill>
@@ -3676,7 +3677,7 @@
             </a:ln>
             <a:extLst>
               <a:ext uri="{91240B29-F687-4f45-9708-019B960494DF}">
-                <a14:hiddenLine xmlns="" xmlns:a14="http://schemas.microsoft.com/office/drawing/2010/main" w="9525">
+                <a14:hiddenLine xmlns:a14="http://schemas.microsoft.com/office/drawing/2010/main" xmlns="" w="9525">
                   <a:solidFill>
                     <a:srgbClr val="000000"/>
                   </a:solidFill>
@@ -3738,7 +3739,7 @@
             </a:ln>
             <a:extLst>
               <a:ext uri="{91240B29-F687-4f45-9708-019B960494DF}">
-                <a14:hiddenLine xmlns="" xmlns:a14="http://schemas.microsoft.com/office/drawing/2010/main" w="9525">
+                <a14:hiddenLine xmlns:a14="http://schemas.microsoft.com/office/drawing/2010/main" xmlns="" w="9525">
                   <a:solidFill>
                     <a:srgbClr val="000000"/>
                   </a:solidFill>
@@ -3828,7 +3829,7 @@
             </a:ln>
             <a:extLst>
               <a:ext uri="{91240B29-F687-4f45-9708-019B960494DF}">
-                <a14:hiddenLine xmlns="" xmlns:a14="http://schemas.microsoft.com/office/drawing/2010/main" w="9525">
+                <a14:hiddenLine xmlns:a14="http://schemas.microsoft.com/office/drawing/2010/main" xmlns="" w="9525">
                   <a:solidFill>
                     <a:srgbClr val="000000"/>
                   </a:solidFill>
@@ -3918,7 +3919,7 @@
             </a:ln>
             <a:extLst>
               <a:ext uri="{91240B29-F687-4f45-9708-019B960494DF}">
-                <a14:hiddenLine xmlns="" xmlns:a14="http://schemas.microsoft.com/office/drawing/2010/main" w="9525">
+                <a14:hiddenLine xmlns:a14="http://schemas.microsoft.com/office/drawing/2010/main" xmlns="" w="9525">
                   <a:solidFill>
                     <a:srgbClr val="000000"/>
                   </a:solidFill>
@@ -3980,7 +3981,7 @@
             </a:ln>
             <a:extLst>
               <a:ext uri="{91240B29-F687-4f45-9708-019B960494DF}">
-                <a14:hiddenLine xmlns="" xmlns:a14="http://schemas.microsoft.com/office/drawing/2010/main" w="9525">
+                <a14:hiddenLine xmlns:a14="http://schemas.microsoft.com/office/drawing/2010/main" xmlns="" w="9525">
                   <a:solidFill>
                     <a:srgbClr val="000000"/>
                   </a:solidFill>
@@ -4100,7 +4101,7 @@
             </a:ln>
             <a:extLst>
               <a:ext uri="{91240B29-F687-4f45-9708-019B960494DF}">
-                <a14:hiddenLine xmlns="" xmlns:a14="http://schemas.microsoft.com/office/drawing/2010/main" w="9525">
+                <a14:hiddenLine xmlns:a14="http://schemas.microsoft.com/office/drawing/2010/main" xmlns="" w="9525">
                   <a:solidFill>
                     <a:srgbClr val="000000"/>
                   </a:solidFill>
@@ -4168,7 +4169,7 @@
             </a:ln>
             <a:extLst>
               <a:ext uri="{91240B29-F687-4f45-9708-019B960494DF}">
-                <a14:hiddenLine xmlns="" xmlns:a14="http://schemas.microsoft.com/office/drawing/2010/main" w="9525">
+                <a14:hiddenLine xmlns:a14="http://schemas.microsoft.com/office/drawing/2010/main" xmlns="" w="9525">
                   <a:solidFill>
                     <a:srgbClr val="000000"/>
                   </a:solidFill>
@@ -4258,7 +4259,7 @@
             </a:ln>
             <a:extLst>
               <a:ext uri="{91240B29-F687-4f45-9708-019B960494DF}">
-                <a14:hiddenLine xmlns="" xmlns:a14="http://schemas.microsoft.com/office/drawing/2010/main" w="9525">
+                <a14:hiddenLine xmlns:a14="http://schemas.microsoft.com/office/drawing/2010/main" xmlns="" w="9525">
                   <a:solidFill>
                     <a:srgbClr val="000000"/>
                   </a:solidFill>
@@ -9087,7 +9088,7 @@
           <a:noFill/>
           <a:extLst>
             <a:ext uri="{909E8E84-426E-40dd-AFC4-6F175D3DCCD1}">
-              <a14:hiddenFill xmlns="" xmlns:a14="http://schemas.microsoft.com/office/drawing/2010/main">
+              <a14:hiddenFill xmlns:a14="http://schemas.microsoft.com/office/drawing/2010/main" xmlns="">
                 <a:solidFill>
                   <a:srgbClr val="FFFFFF"/>
                 </a:solidFill>
@@ -9161,7 +9162,7 @@
               </a:ln>
               <a:extLst>
                 <a:ext uri="{91240B29-F687-4f45-9708-019B960494DF}">
-                  <a14:hiddenLine xmlns="" xmlns:a14="http://schemas.microsoft.com/office/drawing/2010/main" w="9525">
+                  <a14:hiddenLine xmlns:a14="http://schemas.microsoft.com/office/drawing/2010/main" xmlns="" w="9525">
                     <a:solidFill>
                       <a:srgbClr val="000000"/>
                     </a:solidFill>
@@ -9251,7 +9252,7 @@
               </a:ln>
               <a:extLst>
                 <a:ext uri="{91240B29-F687-4f45-9708-019B960494DF}">
-                  <a14:hiddenLine xmlns="" xmlns:a14="http://schemas.microsoft.com/office/drawing/2010/main" w="9525">
+                  <a14:hiddenLine xmlns:a14="http://schemas.microsoft.com/office/drawing/2010/main" xmlns="" w="9525">
                     <a:solidFill>
                       <a:srgbClr val="000000"/>
                     </a:solidFill>
@@ -9341,7 +9342,7 @@
               </a:ln>
               <a:extLst>
                 <a:ext uri="{91240B29-F687-4f45-9708-019B960494DF}">
-                  <a14:hiddenLine xmlns="" xmlns:a14="http://schemas.microsoft.com/office/drawing/2010/main" w="9525">
+                  <a14:hiddenLine xmlns:a14="http://schemas.microsoft.com/office/drawing/2010/main" xmlns="" w="9525">
                     <a:solidFill>
                       <a:srgbClr val="000000"/>
                     </a:solidFill>
@@ -9403,7 +9404,7 @@
               </a:ln>
               <a:extLst>
                 <a:ext uri="{91240B29-F687-4f45-9708-019B960494DF}">
-                  <a14:hiddenLine xmlns="" xmlns:a14="http://schemas.microsoft.com/office/drawing/2010/main" w="9525">
+                  <a14:hiddenLine xmlns:a14="http://schemas.microsoft.com/office/drawing/2010/main" xmlns="" w="9525">
                     <a:solidFill>
                       <a:srgbClr val="000000"/>
                     </a:solidFill>
@@ -9493,7 +9494,7 @@
               </a:ln>
               <a:extLst>
                 <a:ext uri="{91240B29-F687-4f45-9708-019B960494DF}">
-                  <a14:hiddenLine xmlns="" xmlns:a14="http://schemas.microsoft.com/office/drawing/2010/main" w="9525">
+                  <a14:hiddenLine xmlns:a14="http://schemas.microsoft.com/office/drawing/2010/main" xmlns="" w="9525">
                     <a:solidFill>
                       <a:srgbClr val="000000"/>
                     </a:solidFill>
@@ -9555,7 +9556,7 @@
               </a:ln>
               <a:extLst>
                 <a:ext uri="{91240B29-F687-4f45-9708-019B960494DF}">
-                  <a14:hiddenLine xmlns="" xmlns:a14="http://schemas.microsoft.com/office/drawing/2010/main" w="9525">
+                  <a14:hiddenLine xmlns:a14="http://schemas.microsoft.com/office/drawing/2010/main" xmlns="" w="9525">
                     <a:solidFill>
                       <a:srgbClr val="000000"/>
                     </a:solidFill>
@@ -9617,7 +9618,7 @@
               </a:ln>
               <a:extLst>
                 <a:ext uri="{91240B29-F687-4f45-9708-019B960494DF}">
-                  <a14:hiddenLine xmlns="" xmlns:a14="http://schemas.microsoft.com/office/drawing/2010/main" w="9525">
+                  <a14:hiddenLine xmlns:a14="http://schemas.microsoft.com/office/drawing/2010/main" xmlns="" w="9525">
                     <a:solidFill>
                       <a:srgbClr val="000000"/>
                     </a:solidFill>
@@ -9707,7 +9708,7 @@
               </a:ln>
               <a:extLst>
                 <a:ext uri="{91240B29-F687-4f45-9708-019B960494DF}">
-                  <a14:hiddenLine xmlns="" xmlns:a14="http://schemas.microsoft.com/office/drawing/2010/main" w="9525">
+                  <a14:hiddenLine xmlns:a14="http://schemas.microsoft.com/office/drawing/2010/main" xmlns="" w="9525">
                     <a:solidFill>
                       <a:srgbClr val="000000"/>
                     </a:solidFill>
@@ -9797,7 +9798,7 @@
               </a:ln>
               <a:extLst>
                 <a:ext uri="{91240B29-F687-4f45-9708-019B960494DF}">
-                  <a14:hiddenLine xmlns="" xmlns:a14="http://schemas.microsoft.com/office/drawing/2010/main" w="9525">
+                  <a14:hiddenLine xmlns:a14="http://schemas.microsoft.com/office/drawing/2010/main" xmlns="" w="9525">
                     <a:solidFill>
                       <a:srgbClr val="000000"/>
                     </a:solidFill>
@@ -9859,7 +9860,7 @@
               </a:ln>
               <a:extLst>
                 <a:ext uri="{91240B29-F687-4f45-9708-019B960494DF}">
-                  <a14:hiddenLine xmlns="" xmlns:a14="http://schemas.microsoft.com/office/drawing/2010/main" w="9525">
+                  <a14:hiddenLine xmlns:a14="http://schemas.microsoft.com/office/drawing/2010/main" xmlns="" w="9525">
                     <a:solidFill>
                       <a:srgbClr val="000000"/>
                     </a:solidFill>
@@ -9969,7 +9970,7 @@
               </a:ln>
               <a:extLst>
                 <a:ext uri="{91240B29-F687-4f45-9708-019B960494DF}">
-                  <a14:hiddenLine xmlns="" xmlns:a14="http://schemas.microsoft.com/office/drawing/2010/main" w="9525">
+                  <a14:hiddenLine xmlns:a14="http://schemas.microsoft.com/office/drawing/2010/main" xmlns="" w="9525">
                     <a:solidFill>
                       <a:srgbClr val="000000"/>
                     </a:solidFill>
@@ -10053,7 +10054,7 @@
               </a:ln>
               <a:extLst>
                 <a:ext uri="{91240B29-F687-4f45-9708-019B960494DF}">
-                  <a14:hiddenLine xmlns="" xmlns:a14="http://schemas.microsoft.com/office/drawing/2010/main" w="9525">
+                  <a14:hiddenLine xmlns:a14="http://schemas.microsoft.com/office/drawing/2010/main" xmlns="" w="9525">
                     <a:solidFill>
                       <a:srgbClr val="000000"/>
                     </a:solidFill>
@@ -10115,7 +10116,7 @@
               </a:ln>
               <a:extLst>
                 <a:ext uri="{91240B29-F687-4f45-9708-019B960494DF}">
-                  <a14:hiddenLine xmlns="" xmlns:a14="http://schemas.microsoft.com/office/drawing/2010/main" w="9525">
+                  <a14:hiddenLine xmlns:a14="http://schemas.microsoft.com/office/drawing/2010/main" xmlns="" w="9525">
                     <a:solidFill>
                       <a:srgbClr val="000000"/>
                     </a:solidFill>
@@ -10177,7 +10178,7 @@
               </a:ln>
               <a:extLst>
                 <a:ext uri="{91240B29-F687-4f45-9708-019B960494DF}">
-                  <a14:hiddenLine xmlns="" xmlns:a14="http://schemas.microsoft.com/office/drawing/2010/main" w="9525">
+                  <a14:hiddenLine xmlns:a14="http://schemas.microsoft.com/office/drawing/2010/main" xmlns="" w="9525">
                     <a:solidFill>
                       <a:srgbClr val="000000"/>
                     </a:solidFill>
@@ -10267,7 +10268,7 @@
               </a:ln>
               <a:extLst>
                 <a:ext uri="{91240B29-F687-4f45-9708-019B960494DF}">
-                  <a14:hiddenLine xmlns="" xmlns:a14="http://schemas.microsoft.com/office/drawing/2010/main" w="9525">
+                  <a14:hiddenLine xmlns:a14="http://schemas.microsoft.com/office/drawing/2010/main" xmlns="" w="9525">
                     <a:solidFill>
                       <a:srgbClr val="000000"/>
                     </a:solidFill>
@@ -10301,7 +10302,7 @@
               </a:ln>
               <a:extLst>
                 <a:ext uri="{91240B29-F687-4f45-9708-019B960494DF}">
-                  <a14:hiddenLine xmlns="" xmlns:a14="http://schemas.microsoft.com/office/drawing/2010/main" w="9525">
+                  <a14:hiddenLine xmlns:a14="http://schemas.microsoft.com/office/drawing/2010/main" xmlns="" w="9525">
                     <a:solidFill>
                       <a:srgbClr val="000000"/>
                     </a:solidFill>
@@ -10366,7 +10367,7 @@
               </a:ln>
               <a:extLst>
                 <a:ext uri="{91240B29-F687-4f45-9708-019B960494DF}">
-                  <a14:hiddenLine xmlns="" xmlns:a14="http://schemas.microsoft.com/office/drawing/2010/main" w="9525">
+                  <a14:hiddenLine xmlns:a14="http://schemas.microsoft.com/office/drawing/2010/main" xmlns="" w="9525">
                     <a:solidFill>
                       <a:srgbClr val="000000"/>
                     </a:solidFill>
@@ -10456,7 +10457,7 @@
               </a:ln>
               <a:extLst>
                 <a:ext uri="{91240B29-F687-4f45-9708-019B960494DF}">
-                  <a14:hiddenLine xmlns="" xmlns:a14="http://schemas.microsoft.com/office/drawing/2010/main" w="9525">
+                  <a14:hiddenLine xmlns:a14="http://schemas.microsoft.com/office/drawing/2010/main" xmlns="" w="9525">
                     <a:solidFill>
                       <a:srgbClr val="000000"/>
                     </a:solidFill>
@@ -10518,7 +10519,7 @@
               </a:ln>
               <a:extLst>
                 <a:ext uri="{91240B29-F687-4f45-9708-019B960494DF}">
-                  <a14:hiddenLine xmlns="" xmlns:a14="http://schemas.microsoft.com/office/drawing/2010/main" w="9525">
+                  <a14:hiddenLine xmlns:a14="http://schemas.microsoft.com/office/drawing/2010/main" xmlns="" w="9525">
                     <a:solidFill>
                       <a:srgbClr val="000000"/>
                     </a:solidFill>
@@ -10608,7 +10609,7 @@
               </a:ln>
               <a:extLst>
                 <a:ext uri="{91240B29-F687-4f45-9708-019B960494DF}">
-                  <a14:hiddenLine xmlns="" xmlns:a14="http://schemas.microsoft.com/office/drawing/2010/main" w="9525">
+                  <a14:hiddenLine xmlns:a14="http://schemas.microsoft.com/office/drawing/2010/main" xmlns="" w="9525">
                     <a:solidFill>
                       <a:srgbClr val="000000"/>
                     </a:solidFill>
@@ -10673,7 +10674,7 @@
               </a:ln>
               <a:extLst>
                 <a:ext uri="{91240B29-F687-4f45-9708-019B960494DF}">
-                  <a14:hiddenLine xmlns="" xmlns:a14="http://schemas.microsoft.com/office/drawing/2010/main" w="9525">
+                  <a14:hiddenLine xmlns:a14="http://schemas.microsoft.com/office/drawing/2010/main" xmlns="" w="9525">
                     <a:solidFill>
                       <a:srgbClr val="000000"/>
                     </a:solidFill>
@@ -10735,7 +10736,7 @@
               </a:ln>
               <a:extLst>
                 <a:ext uri="{91240B29-F687-4f45-9708-019B960494DF}">
-                  <a14:hiddenLine xmlns="" xmlns:a14="http://schemas.microsoft.com/office/drawing/2010/main" w="9525">
+                  <a14:hiddenLine xmlns:a14="http://schemas.microsoft.com/office/drawing/2010/main" xmlns="" w="9525">
                     <a:solidFill>
                       <a:srgbClr val="000000"/>
                     </a:solidFill>
@@ -10825,7 +10826,7 @@
               </a:ln>
               <a:extLst>
                 <a:ext uri="{91240B29-F687-4f45-9708-019B960494DF}">
-                  <a14:hiddenLine xmlns="" xmlns:a14="http://schemas.microsoft.com/office/drawing/2010/main" w="9525">
+                  <a14:hiddenLine xmlns:a14="http://schemas.microsoft.com/office/drawing/2010/main" xmlns="" w="9525">
                     <a:solidFill>
                       <a:srgbClr val="000000"/>
                     </a:solidFill>
@@ -10915,7 +10916,7 @@
               </a:ln>
               <a:extLst>
                 <a:ext uri="{91240B29-F687-4f45-9708-019B960494DF}">
-                  <a14:hiddenLine xmlns="" xmlns:a14="http://schemas.microsoft.com/office/drawing/2010/main" w="9525">
+                  <a14:hiddenLine xmlns:a14="http://schemas.microsoft.com/office/drawing/2010/main" xmlns="" w="9525">
                     <a:solidFill>
                       <a:srgbClr val="000000"/>
                     </a:solidFill>
@@ -10980,7 +10981,7 @@
               </a:ln>
               <a:extLst>
                 <a:ext uri="{91240B29-F687-4f45-9708-019B960494DF}">
-                  <a14:hiddenLine xmlns="" xmlns:a14="http://schemas.microsoft.com/office/drawing/2010/main" w="9525">
+                  <a14:hiddenLine xmlns:a14="http://schemas.microsoft.com/office/drawing/2010/main" xmlns="" w="9525">
                     <a:solidFill>
                       <a:srgbClr val="000000"/>
                     </a:solidFill>
@@ -11100,7 +11101,7 @@
               </a:ln>
               <a:extLst>
                 <a:ext uri="{91240B29-F687-4f45-9708-019B960494DF}">
-                  <a14:hiddenLine xmlns="" xmlns:a14="http://schemas.microsoft.com/office/drawing/2010/main" w="9525">
+                  <a14:hiddenLine xmlns:a14="http://schemas.microsoft.com/office/drawing/2010/main" xmlns="" w="9525">
                     <a:solidFill>
                       <a:srgbClr val="000000"/>
                     </a:solidFill>
@@ -11181,7 +11182,7 @@
               </a:ln>
               <a:extLst>
                 <a:ext uri="{91240B29-F687-4f45-9708-019B960494DF}">
-                  <a14:hiddenLine xmlns="" xmlns:a14="http://schemas.microsoft.com/office/drawing/2010/main" w="9525">
+                  <a14:hiddenLine xmlns:a14="http://schemas.microsoft.com/office/drawing/2010/main" xmlns="" w="9525">
                     <a:solidFill>
                       <a:srgbClr val="000000"/>
                     </a:solidFill>
@@ -11296,7 +11297,7 @@
               </a:ln>
               <a:extLst>
                 <a:ext uri="{91240B29-F687-4f45-9708-019B960494DF}">
-                  <a14:hiddenLine xmlns="" xmlns:a14="http://schemas.microsoft.com/office/drawing/2010/main" w="9525">
+                  <a14:hiddenLine xmlns:a14="http://schemas.microsoft.com/office/drawing/2010/main" xmlns="" w="9525">
                     <a:solidFill>
                       <a:srgbClr val="000000"/>
                     </a:solidFill>
@@ -11386,7 +11387,7 @@
               </a:ln>
               <a:extLst>
                 <a:ext uri="{91240B29-F687-4f45-9708-019B960494DF}">
-                  <a14:hiddenLine xmlns="" xmlns:a14="http://schemas.microsoft.com/office/drawing/2010/main" w="9525">
+                  <a14:hiddenLine xmlns:a14="http://schemas.microsoft.com/office/drawing/2010/main" xmlns="" w="9525">
                     <a:solidFill>
                       <a:srgbClr val="000000"/>
                     </a:solidFill>
@@ -11451,7 +11452,7 @@
               </a:ln>
               <a:extLst>
                 <a:ext uri="{91240B29-F687-4f45-9708-019B960494DF}">
-                  <a14:hiddenLine xmlns="" xmlns:a14="http://schemas.microsoft.com/office/drawing/2010/main" w="9525">
+                  <a14:hiddenLine xmlns:a14="http://schemas.microsoft.com/office/drawing/2010/main" xmlns="" w="9525">
                     <a:solidFill>
                       <a:srgbClr val="000000"/>
                     </a:solidFill>
@@ -11541,7 +11542,7 @@
               </a:ln>
               <a:extLst>
                 <a:ext uri="{91240B29-F687-4f45-9708-019B960494DF}">
-                  <a14:hiddenLine xmlns="" xmlns:a14="http://schemas.microsoft.com/office/drawing/2010/main" w="9525">
+                  <a14:hiddenLine xmlns:a14="http://schemas.microsoft.com/office/drawing/2010/main" xmlns="" w="9525">
                     <a:solidFill>
                       <a:srgbClr val="000000"/>
                     </a:solidFill>
@@ -11609,7 +11610,7 @@
               </a:ln>
               <a:extLst>
                 <a:ext uri="{91240B29-F687-4f45-9708-019B960494DF}">
-                  <a14:hiddenLine xmlns="" xmlns:a14="http://schemas.microsoft.com/office/drawing/2010/main" w="9525">
+                  <a14:hiddenLine xmlns:a14="http://schemas.microsoft.com/office/drawing/2010/main" xmlns="" w="9525">
                     <a:solidFill>
                       <a:srgbClr val="000000"/>
                     </a:solidFill>
@@ -11699,7 +11700,7 @@
               </a:ln>
               <a:extLst>
                 <a:ext uri="{91240B29-F687-4f45-9708-019B960494DF}">
-                  <a14:hiddenLine xmlns="" xmlns:a14="http://schemas.microsoft.com/office/drawing/2010/main" w="9525">
+                  <a14:hiddenLine xmlns:a14="http://schemas.microsoft.com/office/drawing/2010/main" xmlns="" w="9525">
                     <a:solidFill>
                       <a:srgbClr val="000000"/>
                     </a:solidFill>
@@ -11767,7 +11768,7 @@
               </a:ln>
               <a:extLst>
                 <a:ext uri="{91240B29-F687-4f45-9708-019B960494DF}">
-                  <a14:hiddenLine xmlns="" xmlns:a14="http://schemas.microsoft.com/office/drawing/2010/main" w="9525">
+                  <a14:hiddenLine xmlns:a14="http://schemas.microsoft.com/office/drawing/2010/main" xmlns="" w="9525">
                     <a:solidFill>
                       <a:srgbClr val="000000"/>
                     </a:solidFill>
@@ -11857,7 +11858,7 @@
               </a:ln>
               <a:extLst>
                 <a:ext uri="{91240B29-F687-4f45-9708-019B960494DF}">
-                  <a14:hiddenLine xmlns="" xmlns:a14="http://schemas.microsoft.com/office/drawing/2010/main" w="9525">
+                  <a14:hiddenLine xmlns:a14="http://schemas.microsoft.com/office/drawing/2010/main" xmlns="" w="9525">
                     <a:solidFill>
                       <a:srgbClr val="000000"/>
                     </a:solidFill>
@@ -11891,7 +11892,7 @@
               </a:ln>
               <a:extLst>
                 <a:ext uri="{91240B29-F687-4f45-9708-019B960494DF}">
-                  <a14:hiddenLine xmlns="" xmlns:a14="http://schemas.microsoft.com/office/drawing/2010/main" w="9525">
+                  <a14:hiddenLine xmlns:a14="http://schemas.microsoft.com/office/drawing/2010/main" xmlns="" w="9525">
                     <a:solidFill>
                       <a:srgbClr val="000000"/>
                     </a:solidFill>
@@ -12996,6 +12997,111 @@
 </p:sld>
 </file>
 
+<file path=ppt/slides/slide6.xml><?xml version="1.0" encoding="utf-8"?>
+<p:sld xmlns:a="http://schemas.openxmlformats.org/drawingml/2006/main" xmlns:r="http://schemas.openxmlformats.org/officeDocument/2006/relationships" xmlns:p="http://schemas.openxmlformats.org/presentationml/2006/main">
+  <p:cSld>
+    <p:spTree>
+      <p:nvGrpSpPr>
+        <p:cNvPr id="1" name=""/>
+        <p:cNvGrpSpPr/>
+        <p:nvPr/>
+      </p:nvGrpSpPr>
+      <p:grpSpPr>
+        <a:xfrm>
+          <a:off x="0" y="0"/>
+          <a:ext cx="0" cy="0"/>
+          <a:chOff x="0" y="0"/>
+          <a:chExt cx="0" cy="0"/>
+        </a:xfrm>
+      </p:grpSpPr>
+      <p:sp>
+        <p:nvSpPr>
+          <p:cNvPr id="2" name="Title 1"/>
+          <p:cNvSpPr>
+            <a:spLocks noGrp="1"/>
+          </p:cNvSpPr>
+          <p:nvPr>
+            <p:ph type="title"/>
+          </p:nvPr>
+        </p:nvSpPr>
+        <p:spPr/>
+        <p:txBody>
+          <a:bodyPr/>
+          <a:lstStyle/>
+          <a:p>
+            <a:r>
+              <a:rPr lang="en-US" dirty="0"/>
+              <a:t>What we would do in the future </a:t>
+            </a:r>
+          </a:p>
+        </p:txBody>
+      </p:sp>
+      <p:sp>
+        <p:nvSpPr>
+          <p:cNvPr id="3" name="Content Placeholder 2"/>
+          <p:cNvSpPr>
+            <a:spLocks noGrp="1"/>
+          </p:cNvSpPr>
+          <p:nvPr>
+            <p:ph idx="1"/>
+          </p:nvPr>
+        </p:nvSpPr>
+        <p:spPr>
+          <a:xfrm>
+            <a:off x="1023426" y="2043010"/>
+            <a:ext cx="9905999" cy="3369649"/>
+          </a:xfrm>
+        </p:spPr>
+        <p:txBody>
+          <a:bodyPr>
+            <a:normAutofit/>
+          </a:bodyPr>
+          <a:lstStyle/>
+          <a:p>
+            <a:r>
+              <a:rPr lang="en-US" sz="2200" dirty="0"/>
+              <a:t>Sometimes the Snake starts on the edge so fixing that bug would need to happen. </a:t>
+            </a:r>
+          </a:p>
+          <a:p>
+            <a:r>
+              <a:rPr lang="en-US" sz="2200" dirty="0"/>
+              <a:t>We would add an option to play again.</a:t>
+            </a:r>
+          </a:p>
+          <a:p>
+            <a:r>
+              <a:rPr lang="en-US" sz="2200" dirty="0"/>
+              <a:t>We would fix a bug that does not allow the Snake to turn around and reverse direction.</a:t>
+            </a:r>
+          </a:p>
+          <a:p>
+            <a:r>
+              <a:rPr lang="en-US" sz="2200" dirty="0"/>
+              <a:t>We would fix a bug to even out the speed for the Snake in all directions</a:t>
+            </a:r>
+          </a:p>
+          <a:p>
+            <a:r>
+              <a:rPr lang="en-US" sz="2200" dirty="0"/>
+              <a:t>We would fix a bug where random movements end the game for no reason.</a:t>
+            </a:r>
+          </a:p>
+        </p:txBody>
+      </p:sp>
+    </p:spTree>
+    <p:extLst>
+      <p:ext uri="{BB962C8B-B14F-4D97-AF65-F5344CB8AC3E}">
+        <p14:creationId xmlns:p14="http://schemas.microsoft.com/office/powerpoint/2010/main" val="4182512522"/>
+      </p:ext>
+    </p:extLst>
+  </p:cSld>
+  <p:clrMapOvr>
+    <a:masterClrMapping/>
+  </p:clrMapOvr>
+</p:sld>
+</file>
+
 <file path=ppt/theme/theme1.xml><?xml version="1.0" encoding="utf-8"?>
 <a:theme xmlns:a="http://schemas.openxmlformats.org/drawingml/2006/main" name="Circuit">
   <a:themeElements>

</xml_diff>